<commit_message>
docs/DeveloperGuide: update class diagrams
The class diagrams are not up-to-date.

Let's update the class diagrams so that developers can understand our
application architecture design easily.
</commit_message>
<xml_diff>
--- a/docs/diagrams/LogicComponentClassDiagram.pptx
+++ b/docs/diagrams/LogicComponentClassDiagram.pptx
@@ -208,7 +208,7 @@
           <a:p>
             <a:fld id="{F5CC4B3F-88C1-4FFA-B1B6-F41C21DC6924}" type="datetimeFigureOut">
               <a:rPr lang="en-US" smtClean="0"/>
-              <a:t>2/26/2019</a:t>
+              <a:t>4/1/2019</a:t>
             </a:fld>
             <a:endParaRPr lang="en-US"/>
           </a:p>
@@ -654,7 +654,7 @@
           <a:p>
             <a:fld id="{78C97017-6FC3-485B-9764-EAC9E56C1D49}" type="datetimeFigureOut">
               <a:rPr lang="en-US" smtClean="0"/>
-              <a:t>2/26/2019</a:t>
+              <a:t>4/1/2019</a:t>
             </a:fld>
             <a:endParaRPr lang="en-US"/>
           </a:p>
@@ -822,7 +822,7 @@
           <a:p>
             <a:fld id="{78C97017-6FC3-485B-9764-EAC9E56C1D49}" type="datetimeFigureOut">
               <a:rPr lang="en-US" smtClean="0"/>
-              <a:t>2/26/2019</a:t>
+              <a:t>4/1/2019</a:t>
             </a:fld>
             <a:endParaRPr lang="en-US"/>
           </a:p>
@@ -1000,7 +1000,7 @@
           <a:p>
             <a:fld id="{78C97017-6FC3-485B-9764-EAC9E56C1D49}" type="datetimeFigureOut">
               <a:rPr lang="en-US" smtClean="0"/>
-              <a:t>2/26/2019</a:t>
+              <a:t>4/1/2019</a:t>
             </a:fld>
             <a:endParaRPr lang="en-US"/>
           </a:p>
@@ -1168,7 +1168,7 @@
           <a:p>
             <a:fld id="{78C97017-6FC3-485B-9764-EAC9E56C1D49}" type="datetimeFigureOut">
               <a:rPr lang="en-US" smtClean="0"/>
-              <a:t>2/26/2019</a:t>
+              <a:t>4/1/2019</a:t>
             </a:fld>
             <a:endParaRPr lang="en-US"/>
           </a:p>
@@ -1413,7 +1413,7 @@
           <a:p>
             <a:fld id="{78C97017-6FC3-485B-9764-EAC9E56C1D49}" type="datetimeFigureOut">
               <a:rPr lang="en-US" smtClean="0"/>
-              <a:t>2/26/2019</a:t>
+              <a:t>4/1/2019</a:t>
             </a:fld>
             <a:endParaRPr lang="en-US"/>
           </a:p>
@@ -1698,7 +1698,7 @@
           <a:p>
             <a:fld id="{78C97017-6FC3-485B-9764-EAC9E56C1D49}" type="datetimeFigureOut">
               <a:rPr lang="en-US" smtClean="0"/>
-              <a:t>2/26/2019</a:t>
+              <a:t>4/1/2019</a:t>
             </a:fld>
             <a:endParaRPr lang="en-US"/>
           </a:p>
@@ -2117,7 +2117,7 @@
           <a:p>
             <a:fld id="{78C97017-6FC3-485B-9764-EAC9E56C1D49}" type="datetimeFigureOut">
               <a:rPr lang="en-US" smtClean="0"/>
-              <a:t>2/26/2019</a:t>
+              <a:t>4/1/2019</a:t>
             </a:fld>
             <a:endParaRPr lang="en-US"/>
           </a:p>
@@ -2234,7 +2234,7 @@
           <a:p>
             <a:fld id="{78C97017-6FC3-485B-9764-EAC9E56C1D49}" type="datetimeFigureOut">
               <a:rPr lang="en-US" smtClean="0"/>
-              <a:t>2/26/2019</a:t>
+              <a:t>4/1/2019</a:t>
             </a:fld>
             <a:endParaRPr lang="en-US"/>
           </a:p>
@@ -2329,7 +2329,7 @@
           <a:p>
             <a:fld id="{78C97017-6FC3-485B-9764-EAC9E56C1D49}" type="datetimeFigureOut">
               <a:rPr lang="en-US" smtClean="0"/>
-              <a:t>2/26/2019</a:t>
+              <a:t>4/1/2019</a:t>
             </a:fld>
             <a:endParaRPr lang="en-US"/>
           </a:p>
@@ -2604,7 +2604,7 @@
           <a:p>
             <a:fld id="{78C97017-6FC3-485B-9764-EAC9E56C1D49}" type="datetimeFigureOut">
               <a:rPr lang="en-US" smtClean="0"/>
-              <a:t>2/26/2019</a:t>
+              <a:t>4/1/2019</a:t>
             </a:fld>
             <a:endParaRPr lang="en-US"/>
           </a:p>
@@ -2856,7 +2856,7 @@
           <a:p>
             <a:fld id="{78C97017-6FC3-485B-9764-EAC9E56C1D49}" type="datetimeFigureOut">
               <a:rPr lang="en-US" smtClean="0"/>
-              <a:t>2/26/2019</a:t>
+              <a:t>4/1/2019</a:t>
             </a:fld>
             <a:endParaRPr lang="en-US"/>
           </a:p>
@@ -3067,7 +3067,7 @@
           <a:p>
             <a:fld id="{78C97017-6FC3-485B-9764-EAC9E56C1D49}" type="datetimeFigureOut">
               <a:rPr lang="en-US" smtClean="0"/>
-              <a:t>2/26/2019</a:t>
+              <a:t>4/1/2019</a:t>
             </a:fld>
             <a:endParaRPr lang="en-US"/>
           </a:p>
@@ -3456,10 +3456,10 @@
         </p:nvGrpSpPr>
         <p:grpSpPr>
           <a:xfrm>
-            <a:off x="2417312" y="914400"/>
-            <a:ext cx="7260089" cy="4191000"/>
-            <a:chOff x="893311" y="914400"/>
-            <a:chExt cx="7260089" cy="4191000"/>
+            <a:off x="2311810" y="943078"/>
+            <a:ext cx="7390731" cy="4162322"/>
+            <a:chOff x="787809" y="943078"/>
+            <a:chExt cx="7390731" cy="4162322"/>
           </a:xfrm>
         </p:grpSpPr>
         <p:sp>
@@ -3470,7 +3470,7 @@
           </p:nvSpPr>
           <p:spPr>
             <a:xfrm>
-              <a:off x="1066800" y="914400"/>
+              <a:off x="1093800" y="943078"/>
               <a:ext cx="7084740" cy="3733800"/>
             </a:xfrm>
             <a:prstGeom prst="roundRect">
@@ -3531,7 +3531,7 @@
           </p:nvSpPr>
           <p:spPr>
             <a:xfrm>
-              <a:off x="2095948" y="1253067"/>
+              <a:off x="1842698" y="1253067"/>
               <a:ext cx="1093635" cy="346760"/>
             </a:xfrm>
             <a:prstGeom prst="rect">
@@ -3584,70 +3584,14 @@
         </p:sp>
         <p:sp>
           <p:nvSpPr>
-            <p:cNvPr id="4" name="Rectangle 11"/>
-            <p:cNvSpPr/>
-            <p:nvPr/>
-          </p:nvSpPr>
-          <p:spPr>
-            <a:xfrm flipH="1">
-              <a:off x="6878274" y="2740152"/>
-              <a:ext cx="970326" cy="346760"/>
-            </a:xfrm>
-            <a:prstGeom prst="rect">
-              <a:avLst/>
-            </a:prstGeom>
-            <a:ln w="19050">
-              <a:solidFill>
-                <a:srgbClr val="0070C0"/>
-              </a:solidFill>
-            </a:ln>
-            <a:effectLst/>
-          </p:spPr>
-          <p:style>
-            <a:lnRef idx="1">
-              <a:schemeClr val="accent1"/>
-            </a:lnRef>
-            <a:fillRef idx="2">
-              <a:schemeClr val="accent1"/>
-            </a:fillRef>
-            <a:effectRef idx="1">
-              <a:schemeClr val="accent1"/>
-            </a:effectRef>
-            <a:fontRef idx="minor">
-              <a:schemeClr val="dk1"/>
-            </a:fontRef>
-          </p:style>
-          <p:txBody>
-            <a:bodyPr rtlCol="0" anchor="ctr"/>
-            <a:lstStyle/>
-            <a:p>
-              <a:pPr algn="ctr"/>
-              <a:r>
-                <a:rPr lang="en-US" sz="1050" b="1" dirty="0" err="1">
-                  <a:solidFill>
-                    <a:srgbClr val="0070C0"/>
-                  </a:solidFill>
-                </a:rPr>
-                <a:t>XYZCommand</a:t>
-              </a:r>
-              <a:endParaRPr lang="en-SG" sz="1050" b="1" dirty="0">
-                <a:solidFill>
-                  <a:srgbClr val="0070C0"/>
-                </a:solidFill>
-              </a:endParaRPr>
-            </a:p>
-          </p:txBody>
-        </p:sp>
-        <p:sp>
-          <p:nvSpPr>
             <p:cNvPr id="5" name="Rectangle 62"/>
             <p:cNvSpPr/>
             <p:nvPr/>
           </p:nvSpPr>
           <p:spPr>
             <a:xfrm>
-              <a:off x="1782495" y="3583530"/>
-              <a:ext cx="1093635" cy="346760"/>
+              <a:off x="1198877" y="3713224"/>
+              <a:ext cx="948030" cy="300593"/>
             </a:xfrm>
             <a:prstGeom prst="rect">
               <a:avLst/>
@@ -3708,12 +3652,12 @@
           </p:nvCxnSpPr>
           <p:spPr>
             <a:xfrm flipH="1" flipV="1">
-              <a:off x="3189583" y="1426447"/>
-              <a:ext cx="4559332" cy="2895973"/>
+              <a:off x="2936333" y="1426447"/>
+              <a:ext cx="4812582" cy="2994542"/>
             </a:xfrm>
             <a:prstGeom prst="bentConnector3">
               <a:avLst>
-                <a:gd name="adj1" fmla="val -5014"/>
+                <a:gd name="adj1" fmla="val -4750"/>
               </a:avLst>
             </a:prstGeom>
             <a:ln w="19050">
@@ -3745,14 +3689,14 @@
           <p:nvCxnSpPr>
             <p:cNvPr id="8" name="Elbow Connector 122"/>
             <p:cNvCxnSpPr>
-              <a:endCxn id="3" idx="1"/>
+              <a:cxnSpLocks/>
             </p:cNvCxnSpPr>
             <p:nvPr/>
           </p:nvCxnSpPr>
           <p:spPr>
             <a:xfrm>
-              <a:off x="1676400" y="1423587"/>
-              <a:ext cx="419548" cy="2860"/>
+              <a:off x="1246120" y="1310975"/>
+              <a:ext cx="592143" cy="12700"/>
             </a:xfrm>
             <a:prstGeom prst="bentConnector3">
               <a:avLst>
@@ -3852,7 +3796,7 @@
           </p:nvSpPr>
           <p:spPr>
             <a:xfrm>
-              <a:off x="6976872" y="4149040"/>
+              <a:off x="6976872" y="4247609"/>
               <a:ext cx="772043" cy="346760"/>
             </a:xfrm>
             <a:prstGeom prst="rect">
@@ -3923,8 +3867,8 @@
           </p:nvSpPr>
           <p:spPr>
             <a:xfrm>
-              <a:off x="3255418" y="3554995"/>
-              <a:ext cx="1045323" cy="384497"/>
+              <a:off x="2428050" y="3906482"/>
+              <a:ext cx="902280" cy="384497"/>
             </a:xfrm>
             <a:prstGeom prst="rect">
               <a:avLst/>
@@ -3990,14 +3934,14 @@
           <p:nvCxnSpPr>
             <p:cNvPr id="18" name="Straight Arrow Connector 110"/>
             <p:cNvCxnSpPr>
-              <a:stCxn id="12" idx="2"/>
+              <a:cxnSpLocks/>
             </p:cNvCxnSpPr>
             <p:nvPr/>
           </p:nvCxnSpPr>
           <p:spPr>
             <a:xfrm>
-              <a:off x="7362894" y="4495800"/>
-              <a:ext cx="0" cy="281555"/>
+              <a:off x="7362894" y="4615982"/>
+              <a:ext cx="7976" cy="164630"/>
             </a:xfrm>
             <a:prstGeom prst="straightConnector1">
               <a:avLst/>
@@ -4035,7 +3979,7 @@
           </p:nvSpPr>
           <p:spPr>
             <a:xfrm rot="16200000">
-              <a:off x="398120" y="2150720"/>
+              <a:off x="275838" y="2150720"/>
               <a:ext cx="2209800" cy="346760"/>
             </a:xfrm>
             <a:prstGeom prst="rect">
@@ -4105,7 +4049,7 @@
           </p:nvSpPr>
           <p:spPr>
             <a:xfrm>
-              <a:off x="1359039" y="3429000"/>
+              <a:off x="1250555" y="3429000"/>
               <a:ext cx="270504" cy="175523"/>
             </a:xfrm>
             <a:prstGeom prst="triangle">
@@ -4155,18 +4099,20 @@
           <p:nvCxnSpPr>
             <p:cNvPr id="21" name="Elbow Connector 63"/>
             <p:cNvCxnSpPr>
-              <a:stCxn id="5" idx="1"/>
+              <a:cxnSpLocks/>
               <a:endCxn id="20" idx="3"/>
             </p:cNvCxnSpPr>
             <p:nvPr/>
           </p:nvCxnSpPr>
           <p:spPr>
-            <a:xfrm rot="10800000">
-              <a:off x="1494291" y="3604524"/>
-              <a:ext cx="288204" cy="152387"/>
+            <a:xfrm rot="16200000" flipV="1">
+              <a:off x="1282949" y="3707381"/>
+              <a:ext cx="212066" cy="6350"/>
             </a:xfrm>
-            <a:prstGeom prst="bentConnector2">
-              <a:avLst/>
+            <a:prstGeom prst="bentConnector3">
+              <a:avLst>
+                <a:gd name="adj1" fmla="val 50000"/>
+              </a:avLst>
             </a:prstGeom>
             <a:ln w="19050">
               <a:solidFill>
@@ -4197,14 +4143,14 @@
           <p:nvCxnSpPr>
             <p:cNvPr id="23" name="Straight Arrow Connector 57"/>
             <p:cNvCxnSpPr>
-              <a:stCxn id="5" idx="2"/>
+              <a:cxnSpLocks/>
             </p:cNvCxnSpPr>
             <p:nvPr/>
           </p:nvCxnSpPr>
           <p:spPr>
             <a:xfrm>
-              <a:off x="2329313" y="3930290"/>
-              <a:ext cx="1376" cy="854841"/>
+              <a:off x="2049106" y="3997731"/>
+              <a:ext cx="0" cy="775267"/>
             </a:xfrm>
             <a:prstGeom prst="straightConnector1">
               <a:avLst/>
@@ -4241,7 +4187,7 @@
           </p:nvCxnSpPr>
           <p:spPr>
             <a:xfrm>
-              <a:off x="893311" y="2832505"/>
+              <a:off x="787809" y="2832505"/>
               <a:ext cx="419548" cy="2860"/>
             </a:xfrm>
             <a:prstGeom prst="bentConnector3">
@@ -4280,18 +4226,19 @@
           <p:nvCxnSpPr>
             <p:cNvPr id="25" name="Elbow Connector 63"/>
             <p:cNvCxnSpPr>
+              <a:cxnSpLocks/>
               <a:endCxn id="12" idx="1"/>
             </p:cNvCxnSpPr>
             <p:nvPr/>
           </p:nvCxnSpPr>
           <p:spPr>
             <a:xfrm>
-              <a:off x="2281833" y="3939492"/>
-              <a:ext cx="4695039" cy="382928"/>
+              <a:off x="2101527" y="4029852"/>
+              <a:ext cx="4875345" cy="391137"/>
             </a:xfrm>
             <a:prstGeom prst="bentConnector3">
               <a:avLst>
-                <a:gd name="adj1" fmla="val -81"/>
+                <a:gd name="adj1" fmla="val -15"/>
               </a:avLst>
             </a:prstGeom>
             <a:ln w="19050">
@@ -4327,9 +4274,9 @@
           </p:nvGrpSpPr>
           <p:grpSpPr>
             <a:xfrm>
-              <a:off x="4597400" y="4341168"/>
+              <a:off x="4715407" y="4419443"/>
               <a:ext cx="889000" cy="230832"/>
-              <a:chOff x="2895600" y="807932"/>
+              <a:chOff x="3013607" y="886207"/>
               <a:chExt cx="889000" cy="230832"/>
             </a:xfrm>
           </p:grpSpPr>
@@ -4341,7 +4288,7 @@
             </p:nvSpPr>
             <p:spPr>
               <a:xfrm>
-                <a:off x="2895600" y="807932"/>
+                <a:off x="3013607" y="886207"/>
                 <a:ext cx="728806" cy="230832"/>
               </a:xfrm>
               <a:prstGeom prst="rect">
@@ -4380,7 +4327,7 @@
             </p:nvSpPr>
             <p:spPr>
               <a:xfrm rot="5400000">
-                <a:off x="3683524" y="866776"/>
+                <a:off x="3801531" y="945051"/>
                 <a:ext cx="125951" cy="76201"/>
               </a:xfrm>
               <a:prstGeom prst="triangle">
@@ -4526,8 +4473,8 @@
           </p:nvSpPr>
           <p:spPr>
             <a:xfrm>
-              <a:off x="3048000" y="3733800"/>
-              <a:ext cx="131116" cy="230832"/>
+              <a:off x="2245614" y="4114258"/>
+              <a:ext cx="96791" cy="246675"/>
             </a:xfrm>
             <a:prstGeom prst="rect">
               <a:avLst/>
@@ -4560,17 +4507,19 @@
         <p:cxnSp>
           <p:nvCxnSpPr>
             <p:cNvPr id="39" name="Elbow Connector 122"/>
-            <p:cNvCxnSpPr/>
+            <p:cNvCxnSpPr>
+              <a:cxnSpLocks/>
+            </p:cNvCxnSpPr>
             <p:nvPr/>
           </p:nvCxnSpPr>
           <p:spPr>
             <a:xfrm rot="5400000" flipH="1" flipV="1">
-              <a:off x="1193276" y="2601868"/>
-              <a:ext cx="1969553" cy="2764"/>
+              <a:off x="661423" y="2539783"/>
+              <a:ext cx="2189224" cy="157658"/>
             </a:xfrm>
             <a:prstGeom prst="bentConnector3">
               <a:avLst>
-                <a:gd name="adj1" fmla="val 50000"/>
+                <a:gd name="adj1" fmla="val 100043"/>
               </a:avLst>
             </a:prstGeom>
             <a:ln w="19050">
@@ -4606,8 +4555,8 @@
           </p:nvSpPr>
           <p:spPr>
             <a:xfrm>
-              <a:off x="3174214" y="1862795"/>
-              <a:ext cx="751107" cy="346760"/>
+              <a:off x="5201065" y="1900121"/>
+              <a:ext cx="751107" cy="364672"/>
             </a:xfrm>
             <a:prstGeom prst="rect">
               <a:avLst/>
@@ -4648,7 +4597,7 @@
             <a:p>
               <a:pPr algn="ctr"/>
               <a:r>
-                <a:rPr lang="en-US" sz="1050">
+                <a:rPr lang="en-US" sz="1050" dirty="0">
                   <a:solidFill>
                     <a:schemeClr val="bg1"/>
                   </a:solidFill>
@@ -4656,14 +4605,14 @@
                 <a:t>Argument</a:t>
               </a:r>
               <a:br>
-                <a:rPr lang="en-US" sz="1050">
+                <a:rPr lang="en-US" sz="1050" dirty="0">
                   <a:solidFill>
                     <a:schemeClr val="bg1"/>
                   </a:solidFill>
                 </a:rPr>
               </a:br>
               <a:r>
-                <a:rPr lang="en-US" sz="1050">
+                <a:rPr lang="en-US" sz="1050" dirty="0">
                   <a:solidFill>
                     <a:schemeClr val="bg1"/>
                   </a:solidFill>
@@ -4686,7 +4635,7 @@
           </p:nvSpPr>
           <p:spPr>
             <a:xfrm>
-              <a:off x="2238496" y="2454481"/>
+              <a:off x="4398838" y="1580723"/>
               <a:ext cx="726243" cy="174580"/>
             </a:xfrm>
             <a:prstGeom prst="rect">
@@ -4751,8 +4700,8 @@
           </p:nvSpPr>
           <p:spPr>
             <a:xfrm>
-              <a:off x="3186326" y="2841725"/>
-              <a:ext cx="731636" cy="283820"/>
+              <a:off x="3172809" y="1906179"/>
+              <a:ext cx="1148712" cy="364672"/>
             </a:xfrm>
             <a:prstGeom prst="rect">
               <a:avLst/>
@@ -4816,8 +4765,8 @@
           </p:nvSpPr>
           <p:spPr>
             <a:xfrm>
-              <a:off x="3186326" y="3190882"/>
-              <a:ext cx="731636" cy="283820"/>
+              <a:off x="2888858" y="2686238"/>
+              <a:ext cx="1000838" cy="283820"/>
             </a:xfrm>
             <a:prstGeom prst="rect">
               <a:avLst/>
@@ -4878,15 +4827,15 @@
             <p:cNvPr id="13" name="Elbow Connector 12"/>
             <p:cNvCxnSpPr>
               <a:cxnSpLocks/>
-              <a:stCxn id="60" idx="1"/>
-              <a:endCxn id="58" idx="2"/>
+              <a:stCxn id="60" idx="0"/>
+              <a:endCxn id="58" idx="1"/>
             </p:cNvCxnSpPr>
             <p:nvPr/>
           </p:nvCxnSpPr>
           <p:spPr>
-            <a:xfrm rot="10800000">
-              <a:off x="2601618" y="2629061"/>
-              <a:ext cx="584708" cy="354574"/>
+            <a:xfrm rot="5400000" flipH="1" flipV="1">
+              <a:off x="3953918" y="1461260"/>
+              <a:ext cx="238166" cy="651673"/>
             </a:xfrm>
             <a:prstGeom prst="bentConnector2">
               <a:avLst/>
@@ -4924,15 +4873,15 @@
             <p:cNvPr id="50" name="Elbow Connector 49"/>
             <p:cNvCxnSpPr>
               <a:cxnSpLocks/>
-              <a:stCxn id="56" idx="1"/>
-              <a:endCxn id="58" idx="0"/>
+              <a:stCxn id="56" idx="0"/>
+              <a:endCxn id="58" idx="3"/>
             </p:cNvCxnSpPr>
             <p:nvPr/>
           </p:nvCxnSpPr>
           <p:spPr>
-            <a:xfrm rot="10800000" flipV="1">
-              <a:off x="2601618" y="2036175"/>
-              <a:ext cx="572596" cy="418306"/>
+            <a:xfrm rot="16200000" flipV="1">
+              <a:off x="5234796" y="1558298"/>
+              <a:ext cx="232108" cy="451538"/>
             </a:xfrm>
             <a:prstGeom prst="bentConnector2">
               <a:avLst/>
@@ -4973,9 +4922,9 @@
           </p:nvGrpSpPr>
           <p:grpSpPr>
             <a:xfrm rot="10800000">
-              <a:off x="4687086" y="3784757"/>
+              <a:off x="3469421" y="4101189"/>
               <a:ext cx="555486" cy="254462"/>
-              <a:chOff x="3703306" y="644022"/>
+              <a:chOff x="4920971" y="356975"/>
               <a:chExt cx="555486" cy="230832"/>
             </a:xfrm>
           </p:grpSpPr>
@@ -4987,7 +4936,7 @@
             </p:nvSpPr>
             <p:spPr>
               <a:xfrm rot="10800000">
-                <a:off x="3703306" y="644022"/>
+                <a:off x="4920971" y="356975"/>
                 <a:ext cx="555486" cy="230832"/>
               </a:xfrm>
               <a:prstGeom prst="rect">
@@ -5029,7 +4978,7 @@
             </p:nvSpPr>
             <p:spPr>
               <a:xfrm rot="5400000" flipV="1">
-                <a:off x="3700294" y="741689"/>
+                <a:off x="4928297" y="457207"/>
                 <a:ext cx="119885" cy="88141"/>
               </a:xfrm>
               <a:prstGeom prst="triangle">
@@ -5078,7 +5027,7 @@
           </p:nvSpPr>
           <p:spPr>
             <a:xfrm flipV="1">
-              <a:off x="7227643" y="3980475"/>
+              <a:off x="7227641" y="4052861"/>
               <a:ext cx="270504" cy="175523"/>
             </a:xfrm>
             <a:prstGeom prst="triangle">
@@ -5124,92 +5073,6 @@
             </a:p>
           </p:txBody>
         </p:sp>
-        <p:cxnSp>
-          <p:nvCxnSpPr>
-            <p:cNvPr id="96" name="Elbow Connector 95"/>
-            <p:cNvCxnSpPr>
-              <a:stCxn id="87" idx="3"/>
-              <a:endCxn id="4" idx="2"/>
-            </p:cNvCxnSpPr>
-            <p:nvPr/>
-          </p:nvCxnSpPr>
-          <p:spPr>
-            <a:xfrm rot="5400000" flipH="1" flipV="1">
-              <a:off x="6916385" y="3533423"/>
-              <a:ext cx="893563" cy="542"/>
-            </a:xfrm>
-            <a:prstGeom prst="bentConnector3">
-              <a:avLst>
-                <a:gd name="adj1" fmla="val 50000"/>
-              </a:avLst>
-            </a:prstGeom>
-            <a:ln w="19050">
-              <a:headEnd type="none" w="med" len="med"/>
-              <a:tailEnd type="none" w="med" len="med"/>
-            </a:ln>
-          </p:spPr>
-          <p:style>
-            <a:lnRef idx="1">
-              <a:schemeClr val="accent1"/>
-            </a:lnRef>
-            <a:fillRef idx="0">
-              <a:schemeClr val="accent1"/>
-            </a:fillRef>
-            <a:effectRef idx="0">
-              <a:schemeClr val="accent1"/>
-            </a:effectRef>
-            <a:fontRef idx="minor">
-              <a:schemeClr val="tx1"/>
-            </a:fontRef>
-          </p:style>
-        </p:cxnSp>
-        <p:cxnSp>
-          <p:nvCxnSpPr>
-            <p:cNvPr id="122" name="Elbow Connector 63"/>
-            <p:cNvCxnSpPr>
-              <a:cxnSpLocks/>
-              <a:stCxn id="42" idx="1"/>
-              <a:endCxn id="4" idx="3"/>
-            </p:cNvCxnSpPr>
-            <p:nvPr/>
-          </p:nvCxnSpPr>
-          <p:spPr>
-            <a:xfrm flipV="1">
-              <a:off x="6066328" y="2913532"/>
-              <a:ext cx="811946" cy="659"/>
-            </a:xfrm>
-            <a:prstGeom prst="bentConnector3">
-              <a:avLst>
-                <a:gd name="adj1" fmla="val 50000"/>
-              </a:avLst>
-            </a:prstGeom>
-            <a:ln w="19050">
-              <a:solidFill>
-                <a:schemeClr val="accent5">
-                  <a:lumMod val="75000"/>
-                </a:schemeClr>
-              </a:solidFill>
-              <a:prstDash val="sysDot"/>
-              <a:headEnd type="none" w="med" len="med"/>
-              <a:tailEnd type="arrow" w="med" len="med"/>
-            </a:ln>
-            <a:effectLst/>
-          </p:spPr>
-          <p:style>
-            <a:lnRef idx="1">
-              <a:schemeClr val="accent2"/>
-            </a:lnRef>
-            <a:fillRef idx="2">
-              <a:schemeClr val="accent2"/>
-            </a:fillRef>
-            <a:effectRef idx="1">
-              <a:schemeClr val="accent2"/>
-            </a:effectRef>
-            <a:fontRef idx="minor">
-              <a:schemeClr val="dk1"/>
-            </a:fontRef>
-          </p:style>
-        </p:cxnSp>
         <p:sp>
           <p:nvSpPr>
             <p:cNvPr id="109" name="Rectangle 62"/>
@@ -5218,8 +5081,8 @@
           </p:nvSpPr>
           <p:spPr>
             <a:xfrm>
-              <a:off x="3174214" y="2370131"/>
-              <a:ext cx="750156" cy="340758"/>
+              <a:off x="4390312" y="1906179"/>
+              <a:ext cx="750156" cy="358115"/>
             </a:xfrm>
             <a:prstGeom prst="rect">
               <a:avLst/>
@@ -5290,63 +5153,15 @@
             <p:cNvPr id="112" name="Elbow Connector 12"/>
             <p:cNvCxnSpPr>
               <a:cxnSpLocks/>
-              <a:stCxn id="109" idx="1"/>
-              <a:endCxn id="58" idx="3"/>
+              <a:stCxn id="109" idx="0"/>
+              <a:endCxn id="58" idx="2"/>
             </p:cNvCxnSpPr>
             <p:nvPr/>
           </p:nvCxnSpPr>
           <p:spPr>
-            <a:xfrm rot="10800000" flipV="1">
-              <a:off x="2964740" y="2540509"/>
-              <a:ext cx="209475" cy="1261"/>
-            </a:xfrm>
-            <a:prstGeom prst="bentConnector3">
-              <a:avLst>
-                <a:gd name="adj1" fmla="val 50000"/>
-              </a:avLst>
-            </a:prstGeom>
-            <a:ln w="19050">
-              <a:solidFill>
-                <a:schemeClr val="accent5">
-                  <a:lumMod val="60000"/>
-                  <a:lumOff val="40000"/>
-                </a:schemeClr>
-              </a:solidFill>
-              <a:prstDash val="sysDot"/>
-              <a:headEnd type="none" w="med" len="med"/>
-              <a:tailEnd type="arrow" w="med" len="med"/>
-            </a:ln>
-            <a:effectLst/>
-          </p:spPr>
-          <p:style>
-            <a:lnRef idx="1">
-              <a:schemeClr val="accent2"/>
-            </a:lnRef>
-            <a:fillRef idx="2">
-              <a:schemeClr val="accent2"/>
-            </a:fillRef>
-            <a:effectRef idx="1">
-              <a:schemeClr val="accent2"/>
-            </a:effectRef>
-            <a:fontRef idx="minor">
-              <a:schemeClr val="dk1"/>
-            </a:fontRef>
-          </p:style>
-        </p:cxnSp>
-        <p:cxnSp>
-          <p:nvCxnSpPr>
-            <p:cNvPr id="118" name="Elbow Connector 49"/>
-            <p:cNvCxnSpPr>
-              <a:cxnSpLocks/>
-              <a:stCxn id="56" idx="2"/>
-              <a:endCxn id="109" idx="0"/>
-            </p:cNvCxnSpPr>
-            <p:nvPr/>
-          </p:nvCxnSpPr>
-          <p:spPr>
-            <a:xfrm rot="5400000">
-              <a:off x="3469242" y="2289605"/>
-              <a:ext cx="160576" cy="476"/>
+            <a:xfrm rot="16200000" flipV="1">
+              <a:off x="4688237" y="1829026"/>
+              <a:ext cx="150876" cy="3430"/>
             </a:xfrm>
             <a:prstGeom prst="bentConnector3">
               <a:avLst>
@@ -5389,8 +5204,8 @@
           </p:nvSpPr>
           <p:spPr>
             <a:xfrm>
-              <a:off x="1295065" y="4183424"/>
-              <a:ext cx="805984" cy="346760"/>
+              <a:off x="1207357" y="4247609"/>
+              <a:ext cx="754041" cy="346760"/>
             </a:xfrm>
             <a:prstGeom prst="rect">
               <a:avLst/>
@@ -5425,7 +5240,7 @@
             <a:p>
               <a:pPr algn="ctr"/>
               <a:r>
-                <a:rPr lang="en-US" sz="1050">
+                <a:rPr lang="en-US" sz="1050" dirty="0">
                   <a:solidFill>
                     <a:schemeClr val="bg1"/>
                   </a:solidFill>
@@ -5454,13 +5269,16 @@
         <p:cxnSp>
           <p:nvCxnSpPr>
             <p:cNvPr id="88" name="Straight Arrow Connector 57"/>
-            <p:cNvCxnSpPr/>
+            <p:cNvCxnSpPr>
+              <a:cxnSpLocks/>
+              <a:endCxn id="86" idx="0"/>
+            </p:cNvCxnSpPr>
             <p:nvPr/>
           </p:nvCxnSpPr>
           <p:spPr>
             <a:xfrm>
-              <a:off x="1971157" y="3939492"/>
-              <a:ext cx="2022" cy="240622"/>
+              <a:off x="1584378" y="3926330"/>
+              <a:ext cx="0" cy="321279"/>
             </a:xfrm>
             <a:prstGeom prst="straightConnector1">
               <a:avLst/>
@@ -5497,7 +5315,7 @@
           </p:nvSpPr>
           <p:spPr>
             <a:xfrm>
-              <a:off x="1773980" y="4000395"/>
+              <a:off x="1392157" y="4091588"/>
               <a:ext cx="131116" cy="230832"/>
             </a:xfrm>
             <a:prstGeom prst="rect">
@@ -5541,9 +5359,9 @@
             <p:nvPr/>
           </p:nvSpPr>
           <p:spPr>
-            <a:xfrm flipH="1">
-              <a:off x="5067626" y="1981200"/>
-              <a:ext cx="998702" cy="346760"/>
+            <a:xfrm rot="5400000" flipH="1">
+              <a:off x="6110194" y="3090925"/>
+              <a:ext cx="948791" cy="346760"/>
             </a:xfrm>
             <a:prstGeom prst="rect">
               <a:avLst/>
@@ -5607,8 +5425,8 @@
             <p:nvPr/>
           </p:nvSpPr>
           <p:spPr>
-            <a:xfrm flipH="1">
-              <a:off x="5431725" y="2327960"/>
+            <a:xfrm rot="5400000" flipH="1">
+              <a:off x="6195227" y="3145652"/>
               <a:ext cx="270504" cy="175523"/>
             </a:xfrm>
             <a:prstGeom prst="triangle">
@@ -5645,150 +5463,6 @@
             </a:p>
           </p:txBody>
         </p:sp>
-        <p:grpSp>
-          <p:nvGrpSpPr>
-            <p:cNvPr id="85" name="Group 84"/>
-            <p:cNvGrpSpPr/>
-            <p:nvPr/>
-          </p:nvGrpSpPr>
-          <p:grpSpPr>
-            <a:xfrm rot="5400000">
-              <a:off x="6371505" y="2788428"/>
-              <a:ext cx="222304" cy="598286"/>
-              <a:chOff x="3965759" y="592436"/>
-              <a:chExt cx="254462" cy="503902"/>
-            </a:xfrm>
-          </p:grpSpPr>
-          <p:sp>
-            <p:nvSpPr>
-              <p:cNvPr id="89" name="TextBox 88"/>
-              <p:cNvSpPr txBox="1"/>
-              <p:nvPr/>
-            </p:nvSpPr>
-            <p:spPr>
-              <a:xfrm rot="16200000">
-                <a:off x="3841039" y="717156"/>
-                <a:ext cx="503902" cy="254462"/>
-              </a:xfrm>
-              <a:prstGeom prst="rect">
-                <a:avLst/>
-              </a:prstGeom>
-              <a:noFill/>
-            </p:spPr>
-            <p:txBody>
-              <a:bodyPr wrap="square" lIns="0" tIns="0" rIns="0" bIns="0" rtlCol="0">
-                <a:noAutofit/>
-              </a:bodyPr>
-              <a:lstStyle/>
-              <a:p>
-                <a:r>
-                  <a:rPr lang="en-US" sz="1100" dirty="0">
-                    <a:solidFill>
-                      <a:schemeClr val="accent5">
-                        <a:lumMod val="75000"/>
-                      </a:schemeClr>
-                    </a:solidFill>
-                  </a:rPr>
-                  <a:t>creates</a:t>
-                </a:r>
-                <a:endParaRPr lang="en-SG" sz="1100" dirty="0">
-                  <a:solidFill>
-                    <a:schemeClr val="accent5">
-                      <a:lumMod val="75000"/>
-                    </a:schemeClr>
-                  </a:solidFill>
-                </a:endParaRPr>
-              </a:p>
-            </p:txBody>
-          </p:sp>
-          <p:sp>
-            <p:nvSpPr>
-              <p:cNvPr id="92" name="Isosceles Triangle 91"/>
-              <p:cNvSpPr/>
-              <p:nvPr/>
-            </p:nvSpPr>
-            <p:spPr>
-              <a:xfrm rot="10800000" flipV="1">
-                <a:off x="3995991" y="631624"/>
-                <a:ext cx="132157" cy="79956"/>
-              </a:xfrm>
-              <a:prstGeom prst="triangle">
-                <a:avLst/>
-              </a:prstGeom>
-              <a:solidFill>
-                <a:schemeClr val="accent5">
-                  <a:lumMod val="75000"/>
-                </a:schemeClr>
-              </a:solidFill>
-              <a:ln>
-                <a:noFill/>
-              </a:ln>
-            </p:spPr>
-            <p:style>
-              <a:lnRef idx="2">
-                <a:schemeClr val="accent1">
-                  <a:shade val="50000"/>
-                </a:schemeClr>
-              </a:lnRef>
-              <a:fillRef idx="1">
-                <a:schemeClr val="accent1"/>
-              </a:fillRef>
-              <a:effectRef idx="0">
-                <a:schemeClr val="accent1"/>
-              </a:effectRef>
-              <a:fontRef idx="minor">
-                <a:schemeClr val="lt1"/>
-              </a:fontRef>
-            </p:style>
-            <p:txBody>
-              <a:bodyPr rtlCol="0" anchor="ctr"/>
-              <a:lstStyle/>
-              <a:p>
-                <a:pPr algn="ctr"/>
-                <a:endParaRPr lang="en-SG"/>
-              </a:p>
-            </p:txBody>
-          </p:sp>
-        </p:grpSp>
-        <p:cxnSp>
-          <p:nvCxnSpPr>
-            <p:cNvPr id="95" name="Straight Connector 94"/>
-            <p:cNvCxnSpPr/>
-            <p:nvPr/>
-          </p:nvCxnSpPr>
-          <p:spPr>
-            <a:xfrm>
-              <a:off x="2893971" y="3687139"/>
-              <a:ext cx="361447" cy="0"/>
-            </a:xfrm>
-            <a:prstGeom prst="line">
-              <a:avLst/>
-            </a:prstGeom>
-            <a:ln w="19050">
-              <a:solidFill>
-                <a:srgbClr val="0070C0"/>
-              </a:solidFill>
-              <a:prstDash val="solid"/>
-              <a:headEnd type="none" w="med" len="med"/>
-              <a:tailEnd type="arrow" w="med" len="med"/>
-            </a:ln>
-            <a:effectLst/>
-          </p:spPr>
-          <p:style>
-            <a:lnRef idx="1">
-              <a:schemeClr val="accent2"/>
-            </a:lnRef>
-            <a:fillRef idx="2">
-              <a:schemeClr val="accent2"/>
-            </a:fillRef>
-            <a:effectRef idx="1">
-              <a:schemeClr val="accent2"/>
-            </a:effectRef>
-            <a:fontRef idx="minor">
-              <a:schemeClr val="dk1"/>
-            </a:fontRef>
-          </p:style>
-        </p:cxnSp>
         <p:sp>
           <p:nvSpPr>
             <p:cNvPr id="42" name="Rectangle 11"/>
@@ -5797,8 +5471,8 @@
           </p:nvSpPr>
           <p:spPr>
             <a:xfrm flipH="1">
-              <a:off x="5074342" y="2740811"/>
-              <a:ext cx="991986" cy="346760"/>
+              <a:off x="4413516" y="2584863"/>
+              <a:ext cx="991986" cy="498937"/>
             </a:xfrm>
             <a:prstGeom prst="rect">
               <a:avLst/>
@@ -5864,208 +5538,22 @@
         </p:sp>
         <p:cxnSp>
           <p:nvCxnSpPr>
-            <p:cNvPr id="101" name="Elbow Connector 12"/>
+            <p:cNvPr id="51" name="Elbow Connector 50"/>
             <p:cNvCxnSpPr>
               <a:cxnSpLocks/>
-              <a:stCxn id="42" idx="3"/>
+              <a:stCxn id="16" idx="3"/>
             </p:cNvCxnSpPr>
             <p:nvPr/>
           </p:nvCxnSpPr>
           <p:spPr>
-            <a:xfrm rot="10800000">
-              <a:off x="3917734" y="2058661"/>
-              <a:ext cx="1156608" cy="855530"/>
+            <a:xfrm flipV="1">
+              <a:off x="3330330" y="3027551"/>
+              <a:ext cx="1089510" cy="1071180"/>
             </a:xfrm>
             <a:prstGeom prst="bentConnector3">
               <a:avLst>
                 <a:gd name="adj1" fmla="val 50000"/>
               </a:avLst>
-            </a:prstGeom>
-            <a:ln w="19050">
-              <a:solidFill>
-                <a:schemeClr val="accent5">
-                  <a:lumMod val="60000"/>
-                  <a:lumOff val="40000"/>
-                </a:schemeClr>
-              </a:solidFill>
-              <a:prstDash val="sysDot"/>
-              <a:headEnd type="none" w="med" len="med"/>
-              <a:tailEnd type="arrow" w="med" len="med"/>
-            </a:ln>
-            <a:effectLst/>
-          </p:spPr>
-          <p:style>
-            <a:lnRef idx="1">
-              <a:schemeClr val="accent2"/>
-            </a:lnRef>
-            <a:fillRef idx="2">
-              <a:schemeClr val="accent2"/>
-            </a:fillRef>
-            <a:effectRef idx="1">
-              <a:schemeClr val="accent2"/>
-            </a:effectRef>
-            <a:fontRef idx="minor">
-              <a:schemeClr val="dk1"/>
-            </a:fontRef>
-          </p:style>
-        </p:cxnSp>
-        <p:cxnSp>
-          <p:nvCxnSpPr>
-            <p:cNvPr id="102" name="Elbow Connector 12"/>
-            <p:cNvCxnSpPr>
-              <a:cxnSpLocks/>
-              <a:stCxn id="42" idx="3"/>
-            </p:cNvCxnSpPr>
-            <p:nvPr/>
-          </p:nvCxnSpPr>
-          <p:spPr>
-            <a:xfrm rot="10800000">
-              <a:off x="3921964" y="2540511"/>
-              <a:ext cx="1152379" cy="373681"/>
-            </a:xfrm>
-            <a:prstGeom prst="bentConnector3">
-              <a:avLst>
-                <a:gd name="adj1" fmla="val 50000"/>
-              </a:avLst>
-            </a:prstGeom>
-            <a:ln w="19050">
-              <a:solidFill>
-                <a:schemeClr val="accent5">
-                  <a:lumMod val="60000"/>
-                  <a:lumOff val="40000"/>
-                </a:schemeClr>
-              </a:solidFill>
-              <a:prstDash val="sysDot"/>
-              <a:headEnd type="none" w="med" len="med"/>
-              <a:tailEnd type="arrow" w="med" len="med"/>
-            </a:ln>
-            <a:effectLst/>
-          </p:spPr>
-          <p:style>
-            <a:lnRef idx="1">
-              <a:schemeClr val="accent2"/>
-            </a:lnRef>
-            <a:fillRef idx="2">
-              <a:schemeClr val="accent2"/>
-            </a:fillRef>
-            <a:effectRef idx="1">
-              <a:schemeClr val="accent2"/>
-            </a:effectRef>
-            <a:fontRef idx="minor">
-              <a:schemeClr val="dk1"/>
-            </a:fontRef>
-          </p:style>
-        </p:cxnSp>
-        <p:cxnSp>
-          <p:nvCxnSpPr>
-            <p:cNvPr id="103" name="Elbow Connector 12"/>
-            <p:cNvCxnSpPr>
-              <a:cxnSpLocks/>
-              <a:stCxn id="42" idx="3"/>
-            </p:cNvCxnSpPr>
-            <p:nvPr/>
-          </p:nvCxnSpPr>
-          <p:spPr>
-            <a:xfrm rot="10800000" flipV="1">
-              <a:off x="3926192" y="2914191"/>
-              <a:ext cx="1148150" cy="108168"/>
-            </a:xfrm>
-            <a:prstGeom prst="bentConnector3">
-              <a:avLst>
-                <a:gd name="adj1" fmla="val 50000"/>
-              </a:avLst>
-            </a:prstGeom>
-            <a:ln w="19050">
-              <a:solidFill>
-                <a:schemeClr val="accent5">
-                  <a:lumMod val="60000"/>
-                  <a:lumOff val="40000"/>
-                </a:schemeClr>
-              </a:solidFill>
-              <a:prstDash val="sysDot"/>
-              <a:headEnd type="none" w="med" len="med"/>
-              <a:tailEnd type="arrow" w="med" len="med"/>
-            </a:ln>
-            <a:effectLst/>
-          </p:spPr>
-          <p:style>
-            <a:lnRef idx="1">
-              <a:schemeClr val="accent2"/>
-            </a:lnRef>
-            <a:fillRef idx="2">
-              <a:schemeClr val="accent2"/>
-            </a:fillRef>
-            <a:effectRef idx="1">
-              <a:schemeClr val="accent2"/>
-            </a:effectRef>
-            <a:fontRef idx="minor">
-              <a:schemeClr val="dk1"/>
-            </a:fontRef>
-          </p:style>
-        </p:cxnSp>
-        <p:cxnSp>
-          <p:nvCxnSpPr>
-            <p:cNvPr id="104" name="Elbow Connector 12"/>
-            <p:cNvCxnSpPr>
-              <a:cxnSpLocks/>
-              <a:stCxn id="42" idx="3"/>
-            </p:cNvCxnSpPr>
-            <p:nvPr/>
-          </p:nvCxnSpPr>
-          <p:spPr>
-            <a:xfrm rot="10800000" flipV="1">
-              <a:off x="3930422" y="2914191"/>
-              <a:ext cx="1143921" cy="439870"/>
-            </a:xfrm>
-            <a:prstGeom prst="bentConnector3">
-              <a:avLst>
-                <a:gd name="adj1" fmla="val 50000"/>
-              </a:avLst>
-            </a:prstGeom>
-            <a:ln w="19050">
-              <a:solidFill>
-                <a:schemeClr val="accent5">
-                  <a:lumMod val="60000"/>
-                  <a:lumOff val="40000"/>
-                </a:schemeClr>
-              </a:solidFill>
-              <a:prstDash val="sysDot"/>
-              <a:headEnd type="none" w="med" len="med"/>
-              <a:tailEnd type="arrow" w="med" len="med"/>
-            </a:ln>
-            <a:effectLst/>
-          </p:spPr>
-          <p:style>
-            <a:lnRef idx="1">
-              <a:schemeClr val="accent2"/>
-            </a:lnRef>
-            <a:fillRef idx="2">
-              <a:schemeClr val="accent2"/>
-            </a:fillRef>
-            <a:effectRef idx="1">
-              <a:schemeClr val="accent2"/>
-            </a:effectRef>
-            <a:fontRef idx="minor">
-              <a:schemeClr val="dk1"/>
-            </a:fontRef>
-          </p:style>
-        </p:cxnSp>
-        <p:cxnSp>
-          <p:nvCxnSpPr>
-            <p:cNvPr id="51" name="Elbow Connector 50"/>
-            <p:cNvCxnSpPr>
-              <a:stCxn id="16" idx="3"/>
-              <a:endCxn id="42" idx="2"/>
-            </p:cNvCxnSpPr>
-            <p:nvPr/>
-          </p:nvCxnSpPr>
-          <p:spPr>
-            <a:xfrm flipV="1">
-              <a:off x="4300741" y="3087571"/>
-              <a:ext cx="1269594" cy="659673"/>
-            </a:xfrm>
-            <a:prstGeom prst="bentConnector2">
-              <a:avLst/>
             </a:prstGeom>
             <a:ln w="19050">
               <a:solidFill>
@@ -6094,46 +5582,6 @@
             </a:fontRef>
           </p:style>
         </p:cxnSp>
-        <p:cxnSp>
-          <p:nvCxnSpPr>
-            <p:cNvPr id="83" name="Elbow Connector 82"/>
-            <p:cNvCxnSpPr>
-              <a:endCxn id="42" idx="0"/>
-            </p:cNvCxnSpPr>
-            <p:nvPr/>
-          </p:nvCxnSpPr>
-          <p:spPr>
-            <a:xfrm rot="16200000" flipH="1">
-              <a:off x="5451193" y="2621669"/>
-              <a:ext cx="234926" cy="3358"/>
-            </a:xfrm>
-            <a:prstGeom prst="bentConnector3">
-              <a:avLst/>
-            </a:prstGeom>
-            <a:ln>
-              <a:solidFill>
-                <a:schemeClr val="accent5">
-                  <a:lumMod val="75000"/>
-                </a:schemeClr>
-              </a:solidFill>
-              <a:prstDash val="sysDot"/>
-            </a:ln>
-          </p:spPr>
-          <p:style>
-            <a:lnRef idx="1">
-              <a:schemeClr val="accent1"/>
-            </a:lnRef>
-            <a:fillRef idx="0">
-              <a:schemeClr val="accent1"/>
-            </a:fillRef>
-            <a:effectRef idx="0">
-              <a:schemeClr val="accent1"/>
-            </a:effectRef>
-            <a:fontRef idx="minor">
-              <a:schemeClr val="tx1"/>
-            </a:fontRef>
-          </p:style>
-        </p:cxnSp>
         <p:sp>
           <p:nvSpPr>
             <p:cNvPr id="127" name="Folded Corner 126"/>
@@ -6142,7 +5590,7 @@
           </p:nvSpPr>
           <p:spPr>
             <a:xfrm>
-              <a:off x="6263130" y="1981200"/>
+              <a:off x="6668966" y="1458081"/>
               <a:ext cx="1276614" cy="630473"/>
             </a:xfrm>
             <a:prstGeom prst="foldedCorner">
@@ -6218,7 +5666,7 @@
                     <a:schemeClr val="bg1"/>
                   </a:solidFill>
                 </a:rPr>
-                <a:t>FindCommand</a:t>
+                <a:t>EditCommand</a:t>
               </a:r>
               <a:r>
                 <a:rPr lang="en-US" sz="1050" dirty="0">
@@ -6231,7 +5679,1707 @@
             </a:p>
           </p:txBody>
         </p:sp>
+        <p:sp>
+          <p:nvSpPr>
+            <p:cNvPr id="4" name="Rectangle 11"/>
+            <p:cNvSpPr/>
+            <p:nvPr/>
+          </p:nvSpPr>
+          <p:spPr>
+            <a:xfrm flipH="1">
+              <a:off x="5873088" y="2387359"/>
+              <a:ext cx="970326" cy="346760"/>
+            </a:xfrm>
+            <a:prstGeom prst="rect">
+              <a:avLst/>
+            </a:prstGeom>
+            <a:ln w="19050">
+              <a:solidFill>
+                <a:srgbClr val="0070C0"/>
+              </a:solidFill>
+            </a:ln>
+            <a:effectLst/>
+          </p:spPr>
+          <p:style>
+            <a:lnRef idx="1">
+              <a:schemeClr val="accent1"/>
+            </a:lnRef>
+            <a:fillRef idx="2">
+              <a:schemeClr val="accent1"/>
+            </a:fillRef>
+            <a:effectRef idx="1">
+              <a:schemeClr val="accent1"/>
+            </a:effectRef>
+            <a:fontRef idx="minor">
+              <a:schemeClr val="dk1"/>
+            </a:fontRef>
+          </p:style>
+          <p:txBody>
+            <a:bodyPr rtlCol="0" anchor="ctr"/>
+            <a:lstStyle/>
+            <a:p>
+              <a:pPr algn="ctr"/>
+              <a:r>
+                <a:rPr lang="en-US" sz="1050" b="1" dirty="0" err="1">
+                  <a:solidFill>
+                    <a:srgbClr val="0070C0"/>
+                  </a:solidFill>
+                </a:rPr>
+                <a:t>XYZCommand</a:t>
+              </a:r>
+              <a:endParaRPr lang="en-SG" sz="1050" b="1" dirty="0">
+                <a:solidFill>
+                  <a:srgbClr val="0070C0"/>
+                </a:solidFill>
+              </a:endParaRPr>
+            </a:p>
+          </p:txBody>
+        </p:sp>
       </p:grpSp>
+      <p:sp>
+        <p:nvSpPr>
+          <p:cNvPr id="78" name="Rectangle 11">
+            <a:extLst>
+              <a:ext uri="{FF2B5EF4-FFF2-40B4-BE49-F238E27FC236}">
+                <a16:creationId xmlns:a16="http://schemas.microsoft.com/office/drawing/2014/main" id="{892A7D2A-8140-45F6-A8A8-71D1B53D4507}"/>
+              </a:ext>
+            </a:extLst>
+          </p:cNvPr>
+          <p:cNvSpPr/>
+          <p:nvPr/>
+        </p:nvSpPr>
+        <p:spPr>
+          <a:xfrm flipH="1">
+            <a:off x="5939674" y="3478844"/>
+            <a:ext cx="991986" cy="447486"/>
+          </a:xfrm>
+          <a:prstGeom prst="rect">
+            <a:avLst/>
+          </a:prstGeom>
+          <a:solidFill>
+            <a:schemeClr val="accent5">
+              <a:alpha val="81000"/>
+            </a:schemeClr>
+          </a:solidFill>
+          <a:ln/>
+          <a:effectLst/>
+        </p:spPr>
+        <p:style>
+          <a:lnRef idx="1">
+            <a:schemeClr val="accent5"/>
+          </a:lnRef>
+          <a:fillRef idx="2">
+            <a:schemeClr val="accent5"/>
+          </a:fillRef>
+          <a:effectRef idx="1">
+            <a:schemeClr val="accent5"/>
+          </a:effectRef>
+          <a:fontRef idx="minor">
+            <a:schemeClr val="dk1"/>
+          </a:fontRef>
+        </p:style>
+        <p:txBody>
+          <a:bodyPr rtlCol="0" anchor="ctr"/>
+          <a:lstStyle/>
+          <a:p>
+            <a:pPr algn="ctr"/>
+            <a:r>
+              <a:rPr lang="en-US" sz="1050" b="1" dirty="0" err="1">
+                <a:solidFill>
+                  <a:schemeClr val="bg1"/>
+                </a:solidFill>
+              </a:rPr>
+              <a:t>FindCommandParser</a:t>
+            </a:r>
+            <a:endParaRPr lang="en-SG" sz="1050" b="1" dirty="0">
+              <a:solidFill>
+                <a:schemeClr val="bg1"/>
+              </a:solidFill>
+            </a:endParaRPr>
+          </a:p>
+        </p:txBody>
+      </p:sp>
+      <p:sp>
+        <p:nvSpPr>
+          <p:cNvPr id="160" name="Rectangle 62">
+            <a:extLst>
+              <a:ext uri="{FF2B5EF4-FFF2-40B4-BE49-F238E27FC236}">
+                <a16:creationId xmlns:a16="http://schemas.microsoft.com/office/drawing/2014/main" id="{D61C66D0-4D1F-4560-8365-7BDDF1E57F81}"/>
+              </a:ext>
+            </a:extLst>
+          </p:cNvPr>
+          <p:cNvSpPr/>
+          <p:nvPr/>
+        </p:nvSpPr>
+        <p:spPr>
+          <a:xfrm rot="16200000">
+            <a:off x="2822613" y="2236611"/>
+            <a:ext cx="1205831" cy="346760"/>
+          </a:xfrm>
+          <a:prstGeom prst="rect">
+            <a:avLst/>
+          </a:prstGeom>
+          <a:solidFill>
+            <a:schemeClr val="accent5">
+              <a:lumMod val="60000"/>
+              <a:lumOff val="40000"/>
+            </a:schemeClr>
+          </a:solidFill>
+          <a:ln w="19050">
+            <a:solidFill>
+              <a:schemeClr val="accent5">
+                <a:lumMod val="60000"/>
+                <a:lumOff val="40000"/>
+              </a:schemeClr>
+            </a:solidFill>
+          </a:ln>
+          <a:effectLst/>
+        </p:spPr>
+        <p:style>
+          <a:lnRef idx="1">
+            <a:schemeClr val="accent2"/>
+          </a:lnRef>
+          <a:fillRef idx="2">
+            <a:schemeClr val="accent2"/>
+          </a:fillRef>
+          <a:effectRef idx="1">
+            <a:schemeClr val="accent2"/>
+          </a:effectRef>
+          <a:fontRef idx="minor">
+            <a:schemeClr val="dk1"/>
+          </a:fontRef>
+        </p:style>
+        <p:txBody>
+          <a:bodyPr rtlCol="0" anchor="ctr"/>
+          <a:lstStyle/>
+          <a:p>
+            <a:pPr algn="ctr"/>
+            <a:r>
+              <a:rPr lang="en-US" sz="1050" dirty="0" err="1">
+                <a:solidFill>
+                  <a:schemeClr val="bg1"/>
+                </a:solidFill>
+              </a:rPr>
+              <a:t>BooleanExpression</a:t>
+            </a:r>
+            <a:br>
+              <a:rPr lang="en-US" sz="1050" dirty="0">
+                <a:solidFill>
+                  <a:schemeClr val="bg1"/>
+                </a:solidFill>
+              </a:rPr>
+            </a:br>
+            <a:r>
+              <a:rPr lang="en-US" sz="1050" dirty="0">
+                <a:solidFill>
+                  <a:schemeClr val="bg1"/>
+                </a:solidFill>
+              </a:rPr>
+              <a:t>Tokenizer</a:t>
+            </a:r>
+            <a:endParaRPr lang="en-SG" sz="1050" dirty="0">
+              <a:solidFill>
+                <a:schemeClr val="bg1"/>
+              </a:solidFill>
+            </a:endParaRPr>
+          </a:p>
+        </p:txBody>
+      </p:sp>
+      <p:sp>
+        <p:nvSpPr>
+          <p:cNvPr id="161" name="Rectangle 62">
+            <a:extLst>
+              <a:ext uri="{FF2B5EF4-FFF2-40B4-BE49-F238E27FC236}">
+                <a16:creationId xmlns:a16="http://schemas.microsoft.com/office/drawing/2014/main" id="{22FEF57A-F34D-4C41-ABD8-DB6BEE4FFBCD}"/>
+              </a:ext>
+            </a:extLst>
+          </p:cNvPr>
+          <p:cNvSpPr/>
+          <p:nvPr/>
+        </p:nvSpPr>
+        <p:spPr>
+          <a:xfrm>
+            <a:off x="3834486" y="3488847"/>
+            <a:ext cx="1320367" cy="346760"/>
+          </a:xfrm>
+          <a:prstGeom prst="rect">
+            <a:avLst/>
+          </a:prstGeom>
+          <a:solidFill>
+            <a:schemeClr val="accent5">
+              <a:lumMod val="60000"/>
+              <a:lumOff val="40000"/>
+            </a:schemeClr>
+          </a:solidFill>
+          <a:ln w="19050">
+            <a:solidFill>
+              <a:schemeClr val="accent5">
+                <a:lumMod val="60000"/>
+                <a:lumOff val="40000"/>
+              </a:schemeClr>
+            </a:solidFill>
+          </a:ln>
+          <a:effectLst/>
+        </p:spPr>
+        <p:style>
+          <a:lnRef idx="1">
+            <a:schemeClr val="accent2"/>
+          </a:lnRef>
+          <a:fillRef idx="2">
+            <a:schemeClr val="accent2"/>
+          </a:fillRef>
+          <a:effectRef idx="1">
+            <a:schemeClr val="accent2"/>
+          </a:effectRef>
+          <a:fontRef idx="minor">
+            <a:schemeClr val="dk1"/>
+          </a:fontRef>
+        </p:style>
+        <p:txBody>
+          <a:bodyPr rtlCol="0" anchor="ctr"/>
+          <a:lstStyle/>
+          <a:p>
+            <a:pPr algn="ctr"/>
+            <a:r>
+              <a:rPr lang="en-US" sz="1050" dirty="0" err="1">
+                <a:solidFill>
+                  <a:schemeClr val="bg1"/>
+                </a:solidFill>
+              </a:rPr>
+              <a:t>BooleanExpression</a:t>
+            </a:r>
+            <a:br>
+              <a:rPr lang="en-US" sz="1050" dirty="0">
+                <a:solidFill>
+                  <a:schemeClr val="bg1"/>
+                </a:solidFill>
+              </a:rPr>
+            </a:br>
+            <a:r>
+              <a:rPr lang="en-US" sz="1050" dirty="0">
+                <a:solidFill>
+                  <a:schemeClr val="bg1"/>
+                </a:solidFill>
+              </a:rPr>
+              <a:t>Parser</a:t>
+            </a:r>
+            <a:endParaRPr lang="en-SG" sz="1050" dirty="0">
+              <a:solidFill>
+                <a:schemeClr val="bg1"/>
+              </a:solidFill>
+            </a:endParaRPr>
+          </a:p>
+        </p:txBody>
+      </p:sp>
+      <p:cxnSp>
+        <p:nvCxnSpPr>
+          <p:cNvPr id="195" name="Elbow Connector 49">
+            <a:extLst>
+              <a:ext uri="{FF2B5EF4-FFF2-40B4-BE49-F238E27FC236}">
+                <a16:creationId xmlns:a16="http://schemas.microsoft.com/office/drawing/2014/main" id="{3A95BC62-AA41-48D4-86D3-A533E695596C}"/>
+              </a:ext>
+            </a:extLst>
+          </p:cNvPr>
+          <p:cNvCxnSpPr>
+            <a:cxnSpLocks/>
+          </p:cNvCxnSpPr>
+          <p:nvPr/>
+        </p:nvCxnSpPr>
+        <p:spPr>
+          <a:xfrm flipV="1">
+            <a:off x="3610432" y="1960467"/>
+            <a:ext cx="1080824" cy="5149"/>
+          </a:xfrm>
+          <a:prstGeom prst="bentConnector3">
+            <a:avLst>
+              <a:gd name="adj1" fmla="val 50000"/>
+            </a:avLst>
+          </a:prstGeom>
+          <a:ln w="19050">
+            <a:solidFill>
+              <a:schemeClr val="accent5">
+                <a:lumMod val="60000"/>
+                <a:lumOff val="40000"/>
+              </a:schemeClr>
+            </a:solidFill>
+            <a:prstDash val="sysDot"/>
+            <a:headEnd type="none" w="med" len="med"/>
+            <a:tailEnd type="arrow" w="med" len="med"/>
+          </a:ln>
+          <a:effectLst/>
+        </p:spPr>
+        <p:style>
+          <a:lnRef idx="1">
+            <a:schemeClr val="accent2"/>
+          </a:lnRef>
+          <a:fillRef idx="2">
+            <a:schemeClr val="accent2"/>
+          </a:fillRef>
+          <a:effectRef idx="1">
+            <a:schemeClr val="accent2"/>
+          </a:effectRef>
+          <a:fontRef idx="minor">
+            <a:schemeClr val="dk1"/>
+          </a:fontRef>
+        </p:style>
+      </p:cxnSp>
+      <p:cxnSp>
+        <p:nvCxnSpPr>
+          <p:cNvPr id="205" name="Elbow Connector 49">
+            <a:extLst>
+              <a:ext uri="{FF2B5EF4-FFF2-40B4-BE49-F238E27FC236}">
+                <a16:creationId xmlns:a16="http://schemas.microsoft.com/office/drawing/2014/main" id="{23E2739D-20A7-44D9-9327-E9C7C96F084F}"/>
+              </a:ext>
+            </a:extLst>
+          </p:cNvPr>
+          <p:cNvCxnSpPr>
+            <a:cxnSpLocks/>
+            <a:stCxn id="161" idx="1"/>
+            <a:endCxn id="160" idx="1"/>
+          </p:cNvCxnSpPr>
+          <p:nvPr/>
+        </p:nvCxnSpPr>
+        <p:spPr>
+          <a:xfrm rot="10800000">
+            <a:off x="3425530" y="3012907"/>
+            <a:ext cx="408957" cy="649320"/>
+          </a:xfrm>
+          <a:prstGeom prst="bentConnector2">
+            <a:avLst/>
+          </a:prstGeom>
+          <a:ln w="19050">
+            <a:solidFill>
+              <a:schemeClr val="accent5">
+                <a:lumMod val="60000"/>
+                <a:lumOff val="40000"/>
+              </a:schemeClr>
+            </a:solidFill>
+            <a:prstDash val="sysDot"/>
+            <a:headEnd type="none" w="med" len="med"/>
+            <a:tailEnd type="arrow" w="med" len="med"/>
+          </a:ln>
+          <a:effectLst/>
+        </p:spPr>
+        <p:style>
+          <a:lnRef idx="1">
+            <a:schemeClr val="accent2"/>
+          </a:lnRef>
+          <a:fillRef idx="2">
+            <a:schemeClr val="accent2"/>
+          </a:fillRef>
+          <a:effectRef idx="1">
+            <a:schemeClr val="accent2"/>
+          </a:effectRef>
+          <a:fontRef idx="minor">
+            <a:schemeClr val="dk1"/>
+          </a:fontRef>
+        </p:style>
+      </p:cxnSp>
+      <p:cxnSp>
+        <p:nvCxnSpPr>
+          <p:cNvPr id="288" name="Elbow Connector 49">
+            <a:extLst>
+              <a:ext uri="{FF2B5EF4-FFF2-40B4-BE49-F238E27FC236}">
+                <a16:creationId xmlns:a16="http://schemas.microsoft.com/office/drawing/2014/main" id="{7032E938-6BC5-4E5E-AFE0-B07C160452C6}"/>
+              </a:ext>
+            </a:extLst>
+          </p:cNvPr>
+          <p:cNvCxnSpPr>
+            <a:cxnSpLocks/>
+          </p:cNvCxnSpPr>
+          <p:nvPr/>
+        </p:nvCxnSpPr>
+        <p:spPr>
+          <a:xfrm rot="16200000" flipV="1">
+            <a:off x="4515278" y="3251603"/>
+            <a:ext cx="563636" cy="545"/>
+          </a:xfrm>
+          <a:prstGeom prst="bentConnector3">
+            <a:avLst>
+              <a:gd name="adj1" fmla="val 50000"/>
+            </a:avLst>
+          </a:prstGeom>
+          <a:ln w="19050">
+            <a:solidFill>
+              <a:schemeClr val="accent5">
+                <a:lumMod val="60000"/>
+                <a:lumOff val="40000"/>
+              </a:schemeClr>
+            </a:solidFill>
+            <a:prstDash val="sysDot"/>
+            <a:headEnd type="none" w="med" len="med"/>
+            <a:tailEnd type="arrow" w="med" len="med"/>
+          </a:ln>
+          <a:effectLst/>
+        </p:spPr>
+        <p:style>
+          <a:lnRef idx="1">
+            <a:schemeClr val="accent2"/>
+          </a:lnRef>
+          <a:fillRef idx="2">
+            <a:schemeClr val="accent2"/>
+          </a:fillRef>
+          <a:effectRef idx="1">
+            <a:schemeClr val="accent2"/>
+          </a:effectRef>
+          <a:fontRef idx="minor">
+            <a:schemeClr val="dk1"/>
+          </a:fontRef>
+        </p:style>
+      </p:cxnSp>
+      <p:cxnSp>
+        <p:nvCxnSpPr>
+          <p:cNvPr id="297" name="Elbow Connector 49">
+            <a:extLst>
+              <a:ext uri="{FF2B5EF4-FFF2-40B4-BE49-F238E27FC236}">
+                <a16:creationId xmlns:a16="http://schemas.microsoft.com/office/drawing/2014/main" id="{E44C0B69-1DA1-4C81-8421-45BFC0C02FC7}"/>
+              </a:ext>
+            </a:extLst>
+          </p:cNvPr>
+          <p:cNvCxnSpPr>
+            <a:cxnSpLocks/>
+            <a:endCxn id="60" idx="1"/>
+          </p:cNvCxnSpPr>
+          <p:nvPr/>
+        </p:nvCxnSpPr>
+        <p:spPr>
+          <a:xfrm rot="5400000" flipH="1" flipV="1">
+            <a:off x="3499706" y="2344023"/>
+            <a:ext cx="1452612" cy="941596"/>
+          </a:xfrm>
+          <a:prstGeom prst="bentConnector2">
+            <a:avLst/>
+          </a:prstGeom>
+          <a:ln w="19050">
+            <a:solidFill>
+              <a:schemeClr val="accent5">
+                <a:lumMod val="60000"/>
+                <a:lumOff val="40000"/>
+              </a:schemeClr>
+            </a:solidFill>
+            <a:prstDash val="sysDot"/>
+            <a:headEnd type="none" w="med" len="med"/>
+            <a:tailEnd type="arrow" w="med" len="med"/>
+          </a:ln>
+          <a:effectLst/>
+        </p:spPr>
+        <p:style>
+          <a:lnRef idx="1">
+            <a:schemeClr val="accent2"/>
+          </a:lnRef>
+          <a:fillRef idx="2">
+            <a:schemeClr val="accent2"/>
+          </a:fillRef>
+          <a:effectRef idx="1">
+            <a:schemeClr val="accent2"/>
+          </a:effectRef>
+          <a:fontRef idx="minor">
+            <a:schemeClr val="dk1"/>
+          </a:fontRef>
+        </p:style>
+      </p:cxnSp>
+      <p:sp>
+        <p:nvSpPr>
+          <p:cNvPr id="324" name="Rectangle 62">
+            <a:extLst>
+              <a:ext uri="{FF2B5EF4-FFF2-40B4-BE49-F238E27FC236}">
+                <a16:creationId xmlns:a16="http://schemas.microsoft.com/office/drawing/2014/main" id="{BD2702BE-277D-4D76-9D7C-71B474F2ADB8}"/>
+              </a:ext>
+            </a:extLst>
+          </p:cNvPr>
+          <p:cNvSpPr/>
+          <p:nvPr/>
+        </p:nvSpPr>
+        <p:spPr>
+          <a:xfrm rot="16200000">
+            <a:off x="3437233" y="2662408"/>
+            <a:ext cx="1050917" cy="277731"/>
+          </a:xfrm>
+          <a:prstGeom prst="rect">
+            <a:avLst/>
+          </a:prstGeom>
+          <a:solidFill>
+            <a:schemeClr val="accent5">
+              <a:lumMod val="60000"/>
+              <a:lumOff val="40000"/>
+            </a:schemeClr>
+          </a:solidFill>
+          <a:ln w="19050">
+            <a:solidFill>
+              <a:schemeClr val="accent5">
+                <a:lumMod val="60000"/>
+                <a:lumOff val="40000"/>
+              </a:schemeClr>
+            </a:solidFill>
+          </a:ln>
+          <a:effectLst/>
+        </p:spPr>
+        <p:style>
+          <a:lnRef idx="1">
+            <a:schemeClr val="accent2"/>
+          </a:lnRef>
+          <a:fillRef idx="2">
+            <a:schemeClr val="accent2"/>
+          </a:fillRef>
+          <a:effectRef idx="1">
+            <a:schemeClr val="accent2"/>
+          </a:effectRef>
+          <a:fontRef idx="minor">
+            <a:schemeClr val="dk1"/>
+          </a:fontRef>
+        </p:style>
+        <p:txBody>
+          <a:bodyPr rtlCol="0" anchor="ctr"/>
+          <a:lstStyle/>
+          <a:p>
+            <a:pPr algn="ctr"/>
+            <a:r>
+              <a:rPr lang="en-SG" sz="900" dirty="0">
+                <a:solidFill>
+                  <a:schemeClr val="bg1"/>
+                </a:solidFill>
+              </a:rPr>
+              <a:t>&lt;&lt;enumeration&gt;&gt;</a:t>
+            </a:r>
+            <a:br>
+              <a:rPr lang="en-SG" sz="900" dirty="0">
+                <a:solidFill>
+                  <a:schemeClr val="bg1"/>
+                </a:solidFill>
+              </a:rPr>
+            </a:br>
+            <a:r>
+              <a:rPr lang="en-SG" sz="900" dirty="0">
+                <a:solidFill>
+                  <a:schemeClr val="bg1"/>
+                </a:solidFill>
+              </a:rPr>
+              <a:t>Operators</a:t>
+            </a:r>
+          </a:p>
+        </p:txBody>
+      </p:sp>
+      <p:cxnSp>
+        <p:nvCxnSpPr>
+          <p:cNvPr id="343" name="Connector: Elbow 342">
+            <a:extLst>
+              <a:ext uri="{FF2B5EF4-FFF2-40B4-BE49-F238E27FC236}">
+                <a16:creationId xmlns:a16="http://schemas.microsoft.com/office/drawing/2014/main" id="{F4D485BD-9AB5-4008-95A8-CE02F5F0AB25}"/>
+              </a:ext>
+            </a:extLst>
+          </p:cNvPr>
+          <p:cNvCxnSpPr>
+            <a:cxnSpLocks/>
+            <a:stCxn id="5" idx="3"/>
+            <a:endCxn id="16" idx="1"/>
+          </p:cNvCxnSpPr>
+          <p:nvPr/>
+        </p:nvCxnSpPr>
+        <p:spPr>
+          <a:xfrm>
+            <a:off x="3670908" y="3863521"/>
+            <a:ext cx="281143" cy="235210"/>
+          </a:xfrm>
+          <a:prstGeom prst="bentConnector3">
+            <a:avLst>
+              <a:gd name="adj1" fmla="val 31590"/>
+            </a:avLst>
+          </a:prstGeom>
+          <a:ln w="19050">
+            <a:headEnd type="none" w="med" len="med"/>
+            <a:tailEnd type="arrow" w="med" len="med"/>
+          </a:ln>
+        </p:spPr>
+        <p:style>
+          <a:lnRef idx="1">
+            <a:schemeClr val="accent1"/>
+          </a:lnRef>
+          <a:fillRef idx="0">
+            <a:schemeClr val="accent1"/>
+          </a:fillRef>
+          <a:effectRef idx="0">
+            <a:schemeClr val="accent1"/>
+          </a:effectRef>
+          <a:fontRef idx="minor">
+            <a:schemeClr val="tx1"/>
+          </a:fontRef>
+        </p:style>
+      </p:cxnSp>
+      <p:cxnSp>
+        <p:nvCxnSpPr>
+          <p:cNvPr id="350" name="Connector: Elbow 349">
+            <a:extLst>
+              <a:ext uri="{FF2B5EF4-FFF2-40B4-BE49-F238E27FC236}">
+                <a16:creationId xmlns:a16="http://schemas.microsoft.com/office/drawing/2014/main" id="{CD37D0CF-910A-4306-BBAB-30F23438E62B}"/>
+              </a:ext>
+            </a:extLst>
+          </p:cNvPr>
+          <p:cNvCxnSpPr>
+            <a:cxnSpLocks/>
+          </p:cNvCxnSpPr>
+          <p:nvPr/>
+        </p:nvCxnSpPr>
+        <p:spPr>
+          <a:xfrm flipV="1">
+            <a:off x="3787973" y="3533694"/>
+            <a:ext cx="194202" cy="3"/>
+          </a:xfrm>
+          <a:prstGeom prst="bentConnector3">
+            <a:avLst/>
+          </a:prstGeom>
+          <a:ln w="19050">
+            <a:solidFill>
+              <a:srgbClr val="93CDDD"/>
+            </a:solidFill>
+            <a:prstDash val="sysDot"/>
+          </a:ln>
+        </p:spPr>
+        <p:style>
+          <a:lnRef idx="1">
+            <a:schemeClr val="accent1"/>
+          </a:lnRef>
+          <a:fillRef idx="0">
+            <a:schemeClr val="accent1"/>
+          </a:fillRef>
+          <a:effectRef idx="0">
+            <a:schemeClr val="accent1"/>
+          </a:effectRef>
+          <a:fontRef idx="minor">
+            <a:schemeClr val="tx1"/>
+          </a:fontRef>
+        </p:style>
+      </p:cxnSp>
+      <p:sp>
+        <p:nvSpPr>
+          <p:cNvPr id="358" name="Rectangle 11">
+            <a:extLst>
+              <a:ext uri="{FF2B5EF4-FFF2-40B4-BE49-F238E27FC236}">
+                <a16:creationId xmlns:a16="http://schemas.microsoft.com/office/drawing/2014/main" id="{F82A5E54-5AF1-426B-9D84-793B40A8275F}"/>
+              </a:ext>
+            </a:extLst>
+          </p:cNvPr>
+          <p:cNvSpPr/>
+          <p:nvPr/>
+        </p:nvSpPr>
+        <p:spPr>
+          <a:xfrm flipH="1">
+            <a:off x="7377123" y="3792252"/>
+            <a:ext cx="990292" cy="346760"/>
+          </a:xfrm>
+          <a:prstGeom prst="rect">
+            <a:avLst/>
+          </a:prstGeom>
+          <a:ln w="19050">
+            <a:solidFill>
+              <a:srgbClr val="0070C0"/>
+            </a:solidFill>
+          </a:ln>
+          <a:effectLst/>
+        </p:spPr>
+        <p:style>
+          <a:lnRef idx="1">
+            <a:schemeClr val="accent1"/>
+          </a:lnRef>
+          <a:fillRef idx="2">
+            <a:schemeClr val="accent1"/>
+          </a:fillRef>
+          <a:effectRef idx="1">
+            <a:schemeClr val="accent1"/>
+          </a:effectRef>
+          <a:fontRef idx="minor">
+            <a:schemeClr val="dk1"/>
+          </a:fontRef>
+        </p:style>
+        <p:txBody>
+          <a:bodyPr rtlCol="0" anchor="ctr"/>
+          <a:lstStyle/>
+          <a:p>
+            <a:pPr algn="ctr"/>
+            <a:r>
+              <a:rPr lang="en-US" sz="1050" b="1" dirty="0" err="1">
+                <a:solidFill>
+                  <a:srgbClr val="0070C0"/>
+                </a:solidFill>
+              </a:rPr>
+              <a:t>FindCommand</a:t>
+            </a:r>
+            <a:endParaRPr lang="en-SG" sz="1050" b="1" dirty="0">
+              <a:solidFill>
+                <a:srgbClr val="0070C0"/>
+              </a:solidFill>
+            </a:endParaRPr>
+          </a:p>
+        </p:txBody>
+      </p:sp>
+      <p:cxnSp>
+        <p:nvCxnSpPr>
+          <p:cNvPr id="387" name="Elbow Connector 49">
+            <a:extLst>
+              <a:ext uri="{FF2B5EF4-FFF2-40B4-BE49-F238E27FC236}">
+                <a16:creationId xmlns:a16="http://schemas.microsoft.com/office/drawing/2014/main" id="{943C206D-BC5E-48C5-BAC2-571002749CF2}"/>
+              </a:ext>
+            </a:extLst>
+          </p:cNvPr>
+          <p:cNvCxnSpPr>
+            <a:cxnSpLocks/>
+          </p:cNvCxnSpPr>
+          <p:nvPr/>
+        </p:nvCxnSpPr>
+        <p:spPr>
+          <a:xfrm rot="5400000" flipH="1" flipV="1">
+            <a:off x="4682157" y="2543766"/>
+            <a:ext cx="561654" cy="1"/>
+          </a:xfrm>
+          <a:prstGeom prst="bentConnector3">
+            <a:avLst>
+              <a:gd name="adj1" fmla="val 50000"/>
+            </a:avLst>
+          </a:prstGeom>
+          <a:ln w="19050">
+            <a:solidFill>
+              <a:schemeClr val="accent5">
+                <a:lumMod val="60000"/>
+                <a:lumOff val="40000"/>
+              </a:schemeClr>
+            </a:solidFill>
+            <a:prstDash val="sysDot"/>
+            <a:headEnd type="none" w="med" len="med"/>
+            <a:tailEnd type="arrow" w="med" len="med"/>
+          </a:ln>
+          <a:effectLst/>
+        </p:spPr>
+        <p:style>
+          <a:lnRef idx="1">
+            <a:schemeClr val="accent2"/>
+          </a:lnRef>
+          <a:fillRef idx="2">
+            <a:schemeClr val="accent2"/>
+          </a:fillRef>
+          <a:effectRef idx="1">
+            <a:schemeClr val="accent2"/>
+          </a:effectRef>
+          <a:fontRef idx="minor">
+            <a:schemeClr val="dk1"/>
+          </a:fontRef>
+        </p:style>
+      </p:cxnSp>
+      <p:cxnSp>
+        <p:nvCxnSpPr>
+          <p:cNvPr id="392" name="Elbow Connector 49">
+            <a:extLst>
+              <a:ext uri="{FF2B5EF4-FFF2-40B4-BE49-F238E27FC236}">
+                <a16:creationId xmlns:a16="http://schemas.microsoft.com/office/drawing/2014/main" id="{AF9E86CD-DEF4-4F47-A94B-A3EF8BAD8DF0}"/>
+              </a:ext>
+            </a:extLst>
+          </p:cNvPr>
+          <p:cNvCxnSpPr>
+            <a:cxnSpLocks/>
+            <a:endCxn id="324" idx="1"/>
+          </p:cNvCxnSpPr>
+          <p:nvPr/>
+        </p:nvCxnSpPr>
+        <p:spPr>
+          <a:xfrm rot="10800000">
+            <a:off x="3962692" y="3326733"/>
+            <a:ext cx="428184" cy="187201"/>
+          </a:xfrm>
+          <a:prstGeom prst="bentConnector2">
+            <a:avLst/>
+          </a:prstGeom>
+          <a:ln w="19050">
+            <a:solidFill>
+              <a:schemeClr val="accent5">
+                <a:lumMod val="60000"/>
+                <a:lumOff val="40000"/>
+              </a:schemeClr>
+            </a:solidFill>
+            <a:prstDash val="sysDot"/>
+            <a:headEnd type="none" w="med" len="med"/>
+            <a:tailEnd type="arrow" w="med" len="med"/>
+          </a:ln>
+          <a:effectLst/>
+        </p:spPr>
+        <p:style>
+          <a:lnRef idx="1">
+            <a:schemeClr val="accent2"/>
+          </a:lnRef>
+          <a:fillRef idx="2">
+            <a:schemeClr val="accent2"/>
+          </a:fillRef>
+          <a:effectRef idx="1">
+            <a:schemeClr val="accent2"/>
+          </a:effectRef>
+          <a:fontRef idx="minor">
+            <a:schemeClr val="dk1"/>
+          </a:fontRef>
+        </p:style>
+      </p:cxnSp>
+      <p:cxnSp>
+        <p:nvCxnSpPr>
+          <p:cNvPr id="433" name="Elbow Connector 49">
+            <a:extLst>
+              <a:ext uri="{FF2B5EF4-FFF2-40B4-BE49-F238E27FC236}">
+                <a16:creationId xmlns:a16="http://schemas.microsoft.com/office/drawing/2014/main" id="{2B4FD6D5-67AC-40B5-8824-C10299C8FDC0}"/>
+              </a:ext>
+            </a:extLst>
+          </p:cNvPr>
+          <p:cNvCxnSpPr>
+            <a:cxnSpLocks/>
+            <a:stCxn id="42" idx="3"/>
+            <a:endCxn id="62" idx="3"/>
+          </p:cNvCxnSpPr>
+          <p:nvPr/>
+        </p:nvCxnSpPr>
+        <p:spPr>
+          <a:xfrm rot="10800000">
+            <a:off x="5413697" y="2828148"/>
+            <a:ext cx="523820" cy="6184"/>
+          </a:xfrm>
+          <a:prstGeom prst="bentConnector3">
+            <a:avLst>
+              <a:gd name="adj1" fmla="val 50000"/>
+            </a:avLst>
+          </a:prstGeom>
+          <a:ln w="19050">
+            <a:solidFill>
+              <a:schemeClr val="accent5">
+                <a:lumMod val="60000"/>
+                <a:lumOff val="40000"/>
+              </a:schemeClr>
+            </a:solidFill>
+            <a:prstDash val="sysDot"/>
+            <a:headEnd type="none" w="med" len="med"/>
+            <a:tailEnd type="arrow" w="med" len="med"/>
+          </a:ln>
+          <a:effectLst/>
+        </p:spPr>
+        <p:style>
+          <a:lnRef idx="1">
+            <a:schemeClr val="accent2"/>
+          </a:lnRef>
+          <a:fillRef idx="2">
+            <a:schemeClr val="accent2"/>
+          </a:fillRef>
+          <a:effectRef idx="1">
+            <a:schemeClr val="accent2"/>
+          </a:effectRef>
+          <a:fontRef idx="minor">
+            <a:schemeClr val="dk1"/>
+          </a:fontRef>
+        </p:style>
+      </p:cxnSp>
+      <p:cxnSp>
+        <p:nvCxnSpPr>
+          <p:cNvPr id="413" name="Elbow Connector 49">
+            <a:extLst>
+              <a:ext uri="{FF2B5EF4-FFF2-40B4-BE49-F238E27FC236}">
+                <a16:creationId xmlns:a16="http://schemas.microsoft.com/office/drawing/2014/main" id="{14C250C4-1CF0-4098-A310-D37F1A5B4DDC}"/>
+              </a:ext>
+            </a:extLst>
+          </p:cNvPr>
+          <p:cNvCxnSpPr>
+            <a:cxnSpLocks/>
+          </p:cNvCxnSpPr>
+          <p:nvPr/>
+        </p:nvCxnSpPr>
+        <p:spPr>
+          <a:xfrm rot="5400000" flipH="1" flipV="1">
+            <a:off x="3844037" y="2629819"/>
+            <a:ext cx="1259848" cy="438202"/>
+          </a:xfrm>
+          <a:prstGeom prst="bentConnector3">
+            <a:avLst>
+              <a:gd name="adj1" fmla="val 99984"/>
+            </a:avLst>
+          </a:prstGeom>
+          <a:ln w="19050">
+            <a:solidFill>
+              <a:schemeClr val="accent5">
+                <a:lumMod val="60000"/>
+                <a:lumOff val="40000"/>
+              </a:schemeClr>
+            </a:solidFill>
+            <a:prstDash val="sysDot"/>
+            <a:headEnd type="none" w="med" len="med"/>
+            <a:tailEnd type="arrow" w="med" len="med"/>
+          </a:ln>
+          <a:effectLst/>
+        </p:spPr>
+        <p:style>
+          <a:lnRef idx="1">
+            <a:schemeClr val="accent2"/>
+          </a:lnRef>
+          <a:fillRef idx="2">
+            <a:schemeClr val="accent2"/>
+          </a:fillRef>
+          <a:effectRef idx="1">
+            <a:schemeClr val="accent2"/>
+          </a:effectRef>
+          <a:fontRef idx="minor">
+            <a:schemeClr val="dk1"/>
+          </a:fontRef>
+        </p:style>
+      </p:cxnSp>
+      <p:cxnSp>
+        <p:nvCxnSpPr>
+          <p:cNvPr id="437" name="Elbow Connector 49">
+            <a:extLst>
+              <a:ext uri="{FF2B5EF4-FFF2-40B4-BE49-F238E27FC236}">
+                <a16:creationId xmlns:a16="http://schemas.microsoft.com/office/drawing/2014/main" id="{437786A5-C047-4E2C-BA95-E1829DF4A45B}"/>
+              </a:ext>
+            </a:extLst>
+          </p:cNvPr>
+          <p:cNvCxnSpPr>
+            <a:cxnSpLocks/>
+            <a:stCxn id="42" idx="0"/>
+            <a:endCxn id="56" idx="2"/>
+          </p:cNvCxnSpPr>
+          <p:nvPr/>
+        </p:nvCxnSpPr>
+        <p:spPr>
+          <a:xfrm rot="5400000" flipH="1" flipV="1">
+            <a:off x="6607030" y="2091273"/>
+            <a:ext cx="320070" cy="667110"/>
+          </a:xfrm>
+          <a:prstGeom prst="bentConnector3">
+            <a:avLst>
+              <a:gd name="adj1" fmla="val 37423"/>
+            </a:avLst>
+          </a:prstGeom>
+          <a:ln w="19050">
+            <a:solidFill>
+              <a:schemeClr val="accent5">
+                <a:lumMod val="60000"/>
+                <a:lumOff val="40000"/>
+              </a:schemeClr>
+            </a:solidFill>
+            <a:prstDash val="sysDot"/>
+            <a:headEnd type="none" w="med" len="med"/>
+            <a:tailEnd type="arrow" w="med" len="med"/>
+          </a:ln>
+          <a:effectLst/>
+        </p:spPr>
+        <p:style>
+          <a:lnRef idx="1">
+            <a:schemeClr val="accent2"/>
+          </a:lnRef>
+          <a:fillRef idx="2">
+            <a:schemeClr val="accent2"/>
+          </a:fillRef>
+          <a:effectRef idx="1">
+            <a:schemeClr val="accent2"/>
+          </a:effectRef>
+          <a:fontRef idx="minor">
+            <a:schemeClr val="dk1"/>
+          </a:fontRef>
+        </p:style>
+      </p:cxnSp>
+      <p:cxnSp>
+        <p:nvCxnSpPr>
+          <p:cNvPr id="448" name="Elbow Connector 49">
+            <a:extLst>
+              <a:ext uri="{FF2B5EF4-FFF2-40B4-BE49-F238E27FC236}">
+                <a16:creationId xmlns:a16="http://schemas.microsoft.com/office/drawing/2014/main" id="{F2FBECE2-A66C-4523-BA45-BFD453A9FFF0}"/>
+              </a:ext>
+            </a:extLst>
+          </p:cNvPr>
+          <p:cNvCxnSpPr>
+            <a:cxnSpLocks/>
+          </p:cNvCxnSpPr>
+          <p:nvPr/>
+        </p:nvCxnSpPr>
+        <p:spPr>
+          <a:xfrm rot="5400000" flipH="1" flipV="1">
+            <a:off x="6148257" y="2370925"/>
+            <a:ext cx="213262" cy="1"/>
+          </a:xfrm>
+          <a:prstGeom prst="bentConnector3">
+            <a:avLst>
+              <a:gd name="adj1" fmla="val 50000"/>
+            </a:avLst>
+          </a:prstGeom>
+          <a:ln w="19050">
+            <a:solidFill>
+              <a:schemeClr val="accent5">
+                <a:lumMod val="60000"/>
+                <a:lumOff val="40000"/>
+              </a:schemeClr>
+            </a:solidFill>
+            <a:prstDash val="sysDot"/>
+            <a:headEnd type="none" w="med" len="med"/>
+            <a:tailEnd type="arrow" w="med" len="med"/>
+          </a:ln>
+          <a:effectLst/>
+        </p:spPr>
+        <p:style>
+          <a:lnRef idx="1">
+            <a:schemeClr val="accent2"/>
+          </a:lnRef>
+          <a:fillRef idx="2">
+            <a:schemeClr val="accent2"/>
+          </a:fillRef>
+          <a:effectRef idx="1">
+            <a:schemeClr val="accent2"/>
+          </a:effectRef>
+          <a:fontRef idx="minor">
+            <a:schemeClr val="dk1"/>
+          </a:fontRef>
+        </p:style>
+      </p:cxnSp>
+      <p:cxnSp>
+        <p:nvCxnSpPr>
+          <p:cNvPr id="451" name="Elbow Connector 49">
+            <a:extLst>
+              <a:ext uri="{FF2B5EF4-FFF2-40B4-BE49-F238E27FC236}">
+                <a16:creationId xmlns:a16="http://schemas.microsoft.com/office/drawing/2014/main" id="{E45B96C2-230A-4209-BE9B-A831C802352B}"/>
+              </a:ext>
+            </a:extLst>
+          </p:cNvPr>
+          <p:cNvCxnSpPr>
+            <a:cxnSpLocks/>
+          </p:cNvCxnSpPr>
+          <p:nvPr/>
+        </p:nvCxnSpPr>
+        <p:spPr>
+          <a:xfrm rot="10800000">
+            <a:off x="5639285" y="2283194"/>
+            <a:ext cx="794225" cy="181902"/>
+          </a:xfrm>
+          <a:prstGeom prst="bentConnector3">
+            <a:avLst>
+              <a:gd name="adj1" fmla="val 99963"/>
+            </a:avLst>
+          </a:prstGeom>
+          <a:ln w="19050">
+            <a:solidFill>
+              <a:schemeClr val="accent5">
+                <a:lumMod val="60000"/>
+                <a:lumOff val="40000"/>
+              </a:schemeClr>
+            </a:solidFill>
+            <a:prstDash val="sysDot"/>
+            <a:headEnd type="none" w="med" len="med"/>
+            <a:tailEnd type="arrow" w="med" len="med"/>
+          </a:ln>
+          <a:effectLst/>
+        </p:spPr>
+        <p:style>
+          <a:lnRef idx="1">
+            <a:schemeClr val="accent2"/>
+          </a:lnRef>
+          <a:fillRef idx="2">
+            <a:schemeClr val="accent2"/>
+          </a:fillRef>
+          <a:effectRef idx="1">
+            <a:schemeClr val="accent2"/>
+          </a:effectRef>
+          <a:fontRef idx="minor">
+            <a:schemeClr val="dk1"/>
+          </a:fontRef>
+        </p:style>
+      </p:cxnSp>
+      <p:cxnSp>
+        <p:nvCxnSpPr>
+          <p:cNvPr id="462" name="Elbow Connector 49">
+            <a:extLst>
+              <a:ext uri="{FF2B5EF4-FFF2-40B4-BE49-F238E27FC236}">
+                <a16:creationId xmlns:a16="http://schemas.microsoft.com/office/drawing/2014/main" id="{1BF562BA-A0A5-4EF6-9872-2491229F1563}"/>
+              </a:ext>
+            </a:extLst>
+          </p:cNvPr>
+          <p:cNvCxnSpPr>
+            <a:cxnSpLocks/>
+            <a:endCxn id="161" idx="3"/>
+          </p:cNvCxnSpPr>
+          <p:nvPr/>
+        </p:nvCxnSpPr>
+        <p:spPr>
+          <a:xfrm rot="10800000" flipV="1">
+            <a:off x="5154853" y="3660699"/>
+            <a:ext cx="782664" cy="1528"/>
+          </a:xfrm>
+          <a:prstGeom prst="bentConnector3">
+            <a:avLst>
+              <a:gd name="adj1" fmla="val 50000"/>
+            </a:avLst>
+          </a:prstGeom>
+          <a:ln w="19050">
+            <a:solidFill>
+              <a:schemeClr val="accent5">
+                <a:lumMod val="60000"/>
+                <a:lumOff val="40000"/>
+              </a:schemeClr>
+            </a:solidFill>
+            <a:prstDash val="sysDot"/>
+            <a:headEnd type="none" w="med" len="med"/>
+            <a:tailEnd type="arrow" w="med" len="med"/>
+          </a:ln>
+          <a:effectLst/>
+        </p:spPr>
+        <p:style>
+          <a:lnRef idx="1">
+            <a:schemeClr val="accent2"/>
+          </a:lnRef>
+          <a:fillRef idx="2">
+            <a:schemeClr val="accent2"/>
+          </a:fillRef>
+          <a:effectRef idx="1">
+            <a:schemeClr val="accent2"/>
+          </a:effectRef>
+          <a:fontRef idx="minor">
+            <a:schemeClr val="dk1"/>
+          </a:fontRef>
+        </p:style>
+      </p:cxnSp>
+      <p:cxnSp>
+        <p:nvCxnSpPr>
+          <p:cNvPr id="465" name="Elbow Connector 82">
+            <a:extLst>
+              <a:ext uri="{FF2B5EF4-FFF2-40B4-BE49-F238E27FC236}">
+                <a16:creationId xmlns:a16="http://schemas.microsoft.com/office/drawing/2014/main" id="{C0767269-2091-4306-86EC-699113B8C9DF}"/>
+              </a:ext>
+            </a:extLst>
+          </p:cNvPr>
+          <p:cNvCxnSpPr>
+            <a:cxnSpLocks/>
+            <a:stCxn id="42" idx="2"/>
+            <a:endCxn id="78" idx="0"/>
+          </p:cNvCxnSpPr>
+          <p:nvPr/>
+        </p:nvCxnSpPr>
+        <p:spPr>
+          <a:xfrm rot="16200000" flipH="1">
+            <a:off x="6237066" y="3280243"/>
+            <a:ext cx="395044" cy="2157"/>
+          </a:xfrm>
+          <a:prstGeom prst="bentConnector3">
+            <a:avLst>
+              <a:gd name="adj1" fmla="val 50000"/>
+            </a:avLst>
+          </a:prstGeom>
+          <a:ln>
+            <a:solidFill>
+              <a:schemeClr val="accent5">
+                <a:lumMod val="75000"/>
+              </a:schemeClr>
+            </a:solidFill>
+            <a:prstDash val="sysDot"/>
+          </a:ln>
+        </p:spPr>
+        <p:style>
+          <a:lnRef idx="1">
+            <a:schemeClr val="accent1"/>
+          </a:lnRef>
+          <a:fillRef idx="0">
+            <a:schemeClr val="accent1"/>
+          </a:fillRef>
+          <a:effectRef idx="0">
+            <a:schemeClr val="accent1"/>
+          </a:effectRef>
+          <a:fontRef idx="minor">
+            <a:schemeClr val="tx1"/>
+          </a:fontRef>
+        </p:style>
+      </p:cxnSp>
+      <p:cxnSp>
+        <p:nvCxnSpPr>
+          <p:cNvPr id="470" name="Elbow Connector 82">
+            <a:extLst>
+              <a:ext uri="{FF2B5EF4-FFF2-40B4-BE49-F238E27FC236}">
+                <a16:creationId xmlns:a16="http://schemas.microsoft.com/office/drawing/2014/main" id="{7793E1EE-70C6-4A65-9389-783683F55343}"/>
+              </a:ext>
+            </a:extLst>
+          </p:cNvPr>
+          <p:cNvCxnSpPr>
+            <a:cxnSpLocks/>
+            <a:stCxn id="75" idx="3"/>
+          </p:cNvCxnSpPr>
+          <p:nvPr/>
+        </p:nvCxnSpPr>
+        <p:spPr>
+          <a:xfrm rot="10800000">
+            <a:off x="6445787" y="3233414"/>
+            <a:ext cx="1320932" cy="1"/>
+          </a:xfrm>
+          <a:prstGeom prst="bentConnector3">
+            <a:avLst>
+              <a:gd name="adj1" fmla="val 50000"/>
+            </a:avLst>
+          </a:prstGeom>
+          <a:ln>
+            <a:solidFill>
+              <a:schemeClr val="accent5">
+                <a:lumMod val="75000"/>
+              </a:schemeClr>
+            </a:solidFill>
+            <a:prstDash val="sysDot"/>
+          </a:ln>
+        </p:spPr>
+        <p:style>
+          <a:lnRef idx="1">
+            <a:schemeClr val="accent1"/>
+          </a:lnRef>
+          <a:fillRef idx="0">
+            <a:schemeClr val="accent1"/>
+          </a:fillRef>
+          <a:effectRef idx="0">
+            <a:schemeClr val="accent1"/>
+          </a:effectRef>
+          <a:fontRef idx="minor">
+            <a:schemeClr val="tx1"/>
+          </a:fontRef>
+        </p:style>
+      </p:cxnSp>
+      <p:cxnSp>
+        <p:nvCxnSpPr>
+          <p:cNvPr id="515" name="Elbow Connector 50">
+            <a:extLst>
+              <a:ext uri="{FF2B5EF4-FFF2-40B4-BE49-F238E27FC236}">
+                <a16:creationId xmlns:a16="http://schemas.microsoft.com/office/drawing/2014/main" id="{1E7F2C02-98B5-4487-95DE-A1BE2AE564B6}"/>
+              </a:ext>
+            </a:extLst>
+          </p:cNvPr>
+          <p:cNvCxnSpPr>
+            <a:cxnSpLocks/>
+          </p:cNvCxnSpPr>
+          <p:nvPr/>
+        </p:nvCxnSpPr>
+        <p:spPr>
+          <a:xfrm flipV="1">
+            <a:off x="5388274" y="3816589"/>
+            <a:ext cx="555567" cy="1"/>
+          </a:xfrm>
+          <a:prstGeom prst="bentConnector3">
+            <a:avLst>
+              <a:gd name="adj1" fmla="val 50000"/>
+            </a:avLst>
+          </a:prstGeom>
+          <a:ln w="19050">
+            <a:solidFill>
+              <a:schemeClr val="accent5">
+                <a:lumMod val="75000"/>
+              </a:schemeClr>
+            </a:solidFill>
+            <a:prstDash val="sysDot"/>
+            <a:headEnd type="none" w="med" len="med"/>
+            <a:tailEnd type="arrow" w="med" len="med"/>
+          </a:ln>
+          <a:effectLst/>
+        </p:spPr>
+        <p:style>
+          <a:lnRef idx="1">
+            <a:schemeClr val="accent2"/>
+          </a:lnRef>
+          <a:fillRef idx="2">
+            <a:schemeClr val="accent2"/>
+          </a:fillRef>
+          <a:effectRef idx="1">
+            <a:schemeClr val="accent2"/>
+          </a:effectRef>
+          <a:fontRef idx="minor">
+            <a:schemeClr val="dk1"/>
+          </a:fontRef>
+        </p:style>
+      </p:cxnSp>
+      <p:cxnSp>
+        <p:nvCxnSpPr>
+          <p:cNvPr id="526" name="Elbow Connector 50">
+            <a:extLst>
+              <a:ext uri="{FF2B5EF4-FFF2-40B4-BE49-F238E27FC236}">
+                <a16:creationId xmlns:a16="http://schemas.microsoft.com/office/drawing/2014/main" id="{F28179DB-6C2B-4934-83E6-925F16E63AC5}"/>
+              </a:ext>
+            </a:extLst>
+          </p:cNvPr>
+          <p:cNvCxnSpPr>
+            <a:cxnSpLocks/>
+            <a:stCxn id="78" idx="1"/>
+            <a:endCxn id="358" idx="3"/>
+          </p:cNvCxnSpPr>
+          <p:nvPr/>
+        </p:nvCxnSpPr>
+        <p:spPr>
+          <a:xfrm>
+            <a:off x="6931660" y="3702587"/>
+            <a:ext cx="445463" cy="263045"/>
+          </a:xfrm>
+          <a:prstGeom prst="bentConnector3">
+            <a:avLst>
+              <a:gd name="adj1" fmla="val 50000"/>
+            </a:avLst>
+          </a:prstGeom>
+          <a:ln w="19050">
+            <a:solidFill>
+              <a:schemeClr val="accent5">
+                <a:lumMod val="75000"/>
+              </a:schemeClr>
+            </a:solidFill>
+            <a:prstDash val="sysDot"/>
+            <a:headEnd type="none" w="med" len="med"/>
+            <a:tailEnd type="arrow" w="med" len="med"/>
+          </a:ln>
+          <a:effectLst/>
+        </p:spPr>
+        <p:style>
+          <a:lnRef idx="1">
+            <a:schemeClr val="accent2"/>
+          </a:lnRef>
+          <a:fillRef idx="2">
+            <a:schemeClr val="accent2"/>
+          </a:fillRef>
+          <a:effectRef idx="1">
+            <a:schemeClr val="accent2"/>
+          </a:effectRef>
+          <a:fontRef idx="minor">
+            <a:schemeClr val="dk1"/>
+          </a:fontRef>
+        </p:style>
+      </p:cxnSp>
+      <p:cxnSp>
+        <p:nvCxnSpPr>
+          <p:cNvPr id="529" name="Elbow Connector 50">
+            <a:extLst>
+              <a:ext uri="{FF2B5EF4-FFF2-40B4-BE49-F238E27FC236}">
+                <a16:creationId xmlns:a16="http://schemas.microsoft.com/office/drawing/2014/main" id="{E269C59F-3922-49CC-9000-03ECFEB1A6EA}"/>
+              </a:ext>
+            </a:extLst>
+          </p:cNvPr>
+          <p:cNvCxnSpPr>
+            <a:cxnSpLocks/>
+            <a:stCxn id="42" idx="1"/>
+            <a:endCxn id="4" idx="3"/>
+          </p:cNvCxnSpPr>
+          <p:nvPr/>
+        </p:nvCxnSpPr>
+        <p:spPr>
+          <a:xfrm flipV="1">
+            <a:off x="6929503" y="2560739"/>
+            <a:ext cx="467586" cy="273593"/>
+          </a:xfrm>
+          <a:prstGeom prst="bentConnector3">
+            <a:avLst>
+              <a:gd name="adj1" fmla="val 50000"/>
+            </a:avLst>
+          </a:prstGeom>
+          <a:ln w="19050">
+            <a:solidFill>
+              <a:schemeClr val="accent5">
+                <a:lumMod val="75000"/>
+              </a:schemeClr>
+            </a:solidFill>
+            <a:prstDash val="sysDot"/>
+            <a:headEnd type="none" w="med" len="med"/>
+            <a:tailEnd type="arrow" w="med" len="med"/>
+          </a:ln>
+          <a:effectLst/>
+        </p:spPr>
+        <p:style>
+          <a:lnRef idx="1">
+            <a:schemeClr val="accent2"/>
+          </a:lnRef>
+          <a:fillRef idx="2">
+            <a:schemeClr val="accent2"/>
+          </a:fillRef>
+          <a:effectRef idx="1">
+            <a:schemeClr val="accent2"/>
+          </a:effectRef>
+          <a:fontRef idx="minor">
+            <a:schemeClr val="dk1"/>
+          </a:fontRef>
+        </p:style>
+      </p:cxnSp>
+      <p:sp>
+        <p:nvSpPr>
+          <p:cNvPr id="532" name="TextBox 531">
+            <a:extLst>
+              <a:ext uri="{FF2B5EF4-FFF2-40B4-BE49-F238E27FC236}">
+                <a16:creationId xmlns:a16="http://schemas.microsoft.com/office/drawing/2014/main" id="{12DD2FAE-D1EB-4747-8D7C-F43B22476024}"/>
+              </a:ext>
+            </a:extLst>
+          </p:cNvPr>
+          <p:cNvSpPr txBox="1"/>
+          <p:nvPr/>
+        </p:nvSpPr>
+        <p:spPr>
+          <a:xfrm>
+            <a:off x="6951969" y="2809978"/>
+            <a:ext cx="555486" cy="254462"/>
+          </a:xfrm>
+          <a:prstGeom prst="rect">
+            <a:avLst/>
+          </a:prstGeom>
+          <a:noFill/>
+        </p:spPr>
+        <p:txBody>
+          <a:bodyPr wrap="square" lIns="0" tIns="0" rIns="0" bIns="0" rtlCol="0">
+            <a:noAutofit/>
+          </a:bodyPr>
+          <a:lstStyle/>
+          <a:p>
+            <a:r>
+              <a:rPr lang="en-US" sz="1100" dirty="0">
+                <a:solidFill>
+                  <a:schemeClr val="accent5">
+                    <a:lumMod val="75000"/>
+                  </a:schemeClr>
+                </a:solidFill>
+              </a:rPr>
+              <a:t>creates</a:t>
+            </a:r>
+            <a:endParaRPr lang="en-SG" sz="1100" dirty="0">
+              <a:solidFill>
+                <a:schemeClr val="accent5">
+                  <a:lumMod val="75000"/>
+                </a:schemeClr>
+              </a:solidFill>
+            </a:endParaRPr>
+          </a:p>
+        </p:txBody>
+      </p:sp>
+      <p:sp>
+        <p:nvSpPr>
+          <p:cNvPr id="533" name="Isosceles Triangle 532">
+            <a:extLst>
+              <a:ext uri="{FF2B5EF4-FFF2-40B4-BE49-F238E27FC236}">
+                <a16:creationId xmlns:a16="http://schemas.microsoft.com/office/drawing/2014/main" id="{47318005-9B6A-4C75-B5F5-501F3DB02938}"/>
+              </a:ext>
+            </a:extLst>
+          </p:cNvPr>
+          <p:cNvSpPr/>
+          <p:nvPr/>
+        </p:nvSpPr>
+        <p:spPr>
+          <a:xfrm rot="16200000" flipV="1">
+            <a:off x="7374108" y="2861295"/>
+            <a:ext cx="132157" cy="88141"/>
+          </a:xfrm>
+          <a:prstGeom prst="triangle">
+            <a:avLst/>
+          </a:prstGeom>
+          <a:solidFill>
+            <a:schemeClr val="accent5">
+              <a:lumMod val="75000"/>
+            </a:schemeClr>
+          </a:solidFill>
+          <a:ln>
+            <a:noFill/>
+          </a:ln>
+        </p:spPr>
+        <p:style>
+          <a:lnRef idx="2">
+            <a:schemeClr val="accent1">
+              <a:shade val="50000"/>
+            </a:schemeClr>
+          </a:lnRef>
+          <a:fillRef idx="1">
+            <a:schemeClr val="accent1"/>
+          </a:fillRef>
+          <a:effectRef idx="0">
+            <a:schemeClr val="accent1"/>
+          </a:effectRef>
+          <a:fontRef idx="minor">
+            <a:schemeClr val="lt1"/>
+          </a:fontRef>
+        </p:style>
+        <p:txBody>
+          <a:bodyPr rtlCol="0" anchor="ctr"/>
+          <a:lstStyle/>
+          <a:p>
+            <a:pPr algn="ctr"/>
+            <a:endParaRPr lang="en-SG"/>
+          </a:p>
+        </p:txBody>
+      </p:sp>
+      <p:sp>
+        <p:nvSpPr>
+          <p:cNvPr id="535" name="TextBox 534">
+            <a:extLst>
+              <a:ext uri="{FF2B5EF4-FFF2-40B4-BE49-F238E27FC236}">
+                <a16:creationId xmlns:a16="http://schemas.microsoft.com/office/drawing/2014/main" id="{26C02618-CFDA-4C98-B98A-22F9E360F7C7}"/>
+              </a:ext>
+            </a:extLst>
+          </p:cNvPr>
+          <p:cNvSpPr txBox="1"/>
+          <p:nvPr/>
+        </p:nvSpPr>
+        <p:spPr>
+          <a:xfrm>
+            <a:off x="6950772" y="3475285"/>
+            <a:ext cx="555486" cy="254462"/>
+          </a:xfrm>
+          <a:prstGeom prst="rect">
+            <a:avLst/>
+          </a:prstGeom>
+          <a:noFill/>
+        </p:spPr>
+        <p:txBody>
+          <a:bodyPr wrap="square" lIns="0" tIns="0" rIns="0" bIns="0" rtlCol="0">
+            <a:noAutofit/>
+          </a:bodyPr>
+          <a:lstStyle/>
+          <a:p>
+            <a:r>
+              <a:rPr lang="en-US" sz="1100" dirty="0">
+                <a:solidFill>
+                  <a:schemeClr val="accent5">
+                    <a:lumMod val="75000"/>
+                  </a:schemeClr>
+                </a:solidFill>
+              </a:rPr>
+              <a:t>creates</a:t>
+            </a:r>
+            <a:endParaRPr lang="en-SG" sz="1100" dirty="0">
+              <a:solidFill>
+                <a:schemeClr val="accent5">
+                  <a:lumMod val="75000"/>
+                </a:schemeClr>
+              </a:solidFill>
+            </a:endParaRPr>
+          </a:p>
+        </p:txBody>
+      </p:sp>
+      <p:sp>
+        <p:nvSpPr>
+          <p:cNvPr id="536" name="Isosceles Triangle 535">
+            <a:extLst>
+              <a:ext uri="{FF2B5EF4-FFF2-40B4-BE49-F238E27FC236}">
+                <a16:creationId xmlns:a16="http://schemas.microsoft.com/office/drawing/2014/main" id="{5683C012-009F-47F4-8134-8C0E5FA75747}"/>
+              </a:ext>
+            </a:extLst>
+          </p:cNvPr>
+          <p:cNvSpPr/>
+          <p:nvPr/>
+        </p:nvSpPr>
+        <p:spPr>
+          <a:xfrm rot="16200000" flipV="1">
+            <a:off x="7372911" y="3526602"/>
+            <a:ext cx="132157" cy="88141"/>
+          </a:xfrm>
+          <a:prstGeom prst="triangle">
+            <a:avLst/>
+          </a:prstGeom>
+          <a:solidFill>
+            <a:schemeClr val="accent5">
+              <a:lumMod val="75000"/>
+            </a:schemeClr>
+          </a:solidFill>
+          <a:ln>
+            <a:noFill/>
+          </a:ln>
+        </p:spPr>
+        <p:style>
+          <a:lnRef idx="2">
+            <a:schemeClr val="accent1">
+              <a:shade val="50000"/>
+            </a:schemeClr>
+          </a:lnRef>
+          <a:fillRef idx="1">
+            <a:schemeClr val="accent1"/>
+          </a:fillRef>
+          <a:effectRef idx="0">
+            <a:schemeClr val="accent1"/>
+          </a:effectRef>
+          <a:fontRef idx="minor">
+            <a:schemeClr val="lt1"/>
+          </a:fontRef>
+        </p:style>
+        <p:txBody>
+          <a:bodyPr rtlCol="0" anchor="ctr"/>
+          <a:lstStyle/>
+          <a:p>
+            <a:pPr algn="ctr"/>
+            <a:endParaRPr lang="en-SG"/>
+          </a:p>
+        </p:txBody>
+      </p:sp>
+      <p:cxnSp>
+        <p:nvCxnSpPr>
+          <p:cNvPr id="537" name="Elbow Connector 95">
+            <a:extLst>
+              <a:ext uri="{FF2B5EF4-FFF2-40B4-BE49-F238E27FC236}">
+                <a16:creationId xmlns:a16="http://schemas.microsoft.com/office/drawing/2014/main" id="{30580A9A-C929-4B24-8811-1C0923DDD0F5}"/>
+              </a:ext>
+            </a:extLst>
+          </p:cNvPr>
+          <p:cNvCxnSpPr>
+            <a:cxnSpLocks/>
+            <a:stCxn id="87" idx="3"/>
+            <a:endCxn id="4" idx="1"/>
+          </p:cNvCxnSpPr>
+          <p:nvPr/>
+        </p:nvCxnSpPr>
+        <p:spPr>
+          <a:xfrm rot="16200000" flipV="1">
+            <a:off x="7881094" y="3047060"/>
+            <a:ext cx="1492122" cy="519479"/>
+          </a:xfrm>
+          <a:prstGeom prst="bentConnector2">
+            <a:avLst/>
+          </a:prstGeom>
+          <a:ln w="19050">
+            <a:headEnd type="none" w="med" len="med"/>
+            <a:tailEnd type="none" w="med" len="med"/>
+          </a:ln>
+        </p:spPr>
+        <p:style>
+          <a:lnRef idx="1">
+            <a:schemeClr val="accent1"/>
+          </a:lnRef>
+          <a:fillRef idx="0">
+            <a:schemeClr val="accent1"/>
+          </a:fillRef>
+          <a:effectRef idx="0">
+            <a:schemeClr val="accent1"/>
+          </a:effectRef>
+          <a:fontRef idx="minor">
+            <a:schemeClr val="tx1"/>
+          </a:fontRef>
+        </p:style>
+      </p:cxnSp>
+      <p:cxnSp>
+        <p:nvCxnSpPr>
+          <p:cNvPr id="540" name="Elbow Connector 95">
+            <a:extLst>
+              <a:ext uri="{FF2B5EF4-FFF2-40B4-BE49-F238E27FC236}">
+                <a16:creationId xmlns:a16="http://schemas.microsoft.com/office/drawing/2014/main" id="{0B4A5586-D04E-4B7D-BB61-EB5C22ECD193}"/>
+              </a:ext>
+            </a:extLst>
+          </p:cNvPr>
+          <p:cNvCxnSpPr>
+            <a:cxnSpLocks/>
+            <a:endCxn id="358" idx="1"/>
+          </p:cNvCxnSpPr>
+          <p:nvPr/>
+        </p:nvCxnSpPr>
+        <p:spPr>
+          <a:xfrm rot="10800000" flipV="1">
+            <a:off x="8367416" y="3962882"/>
+            <a:ext cx="527455" cy="2750"/>
+          </a:xfrm>
+          <a:prstGeom prst="bentConnector3">
+            <a:avLst>
+              <a:gd name="adj1" fmla="val 1753"/>
+            </a:avLst>
+          </a:prstGeom>
+          <a:ln w="19050">
+            <a:headEnd type="none" w="med" len="med"/>
+            <a:tailEnd type="none" w="med" len="med"/>
+          </a:ln>
+        </p:spPr>
+        <p:style>
+          <a:lnRef idx="1">
+            <a:schemeClr val="accent1"/>
+          </a:lnRef>
+          <a:fillRef idx="0">
+            <a:schemeClr val="accent1"/>
+          </a:fillRef>
+          <a:effectRef idx="0">
+            <a:schemeClr val="accent1"/>
+          </a:effectRef>
+          <a:fontRef idx="minor">
+            <a:schemeClr val="tx1"/>
+          </a:fontRef>
+        </p:style>
+      </p:cxnSp>
     </p:spTree>
     <p:extLst>
       <p:ext uri="{BB962C8B-B14F-4D97-AF65-F5344CB8AC3E}">

</xml_diff>

<commit_message>
docs/DeveloperGuide: There was some typo in the diagrams
Let's update the diagrams to reflect our classes.
</commit_message>
<xml_diff>
--- a/docs/diagrams/LogicComponentClassDiagram.pptx
+++ b/docs/diagrams/LogicComponentClassDiagram.pptx
@@ -208,7 +208,7 @@
           <a:p>
             <a:fld id="{F5CC4B3F-88C1-4FFA-B1B6-F41C21DC6924}" type="datetimeFigureOut">
               <a:rPr lang="en-US" smtClean="0"/>
-              <a:t>4/1/2019</a:t>
+              <a:t>4/14/19</a:t>
             </a:fld>
             <a:endParaRPr lang="en-US"/>
           </a:p>
@@ -654,7 +654,7 @@
           <a:p>
             <a:fld id="{78C97017-6FC3-485B-9764-EAC9E56C1D49}" type="datetimeFigureOut">
               <a:rPr lang="en-US" smtClean="0"/>
-              <a:t>4/1/2019</a:t>
+              <a:t>4/14/19</a:t>
             </a:fld>
             <a:endParaRPr lang="en-US"/>
           </a:p>
@@ -822,7 +822,7 @@
           <a:p>
             <a:fld id="{78C97017-6FC3-485B-9764-EAC9E56C1D49}" type="datetimeFigureOut">
               <a:rPr lang="en-US" smtClean="0"/>
-              <a:t>4/1/2019</a:t>
+              <a:t>4/14/19</a:t>
             </a:fld>
             <a:endParaRPr lang="en-US"/>
           </a:p>
@@ -1000,7 +1000,7 @@
           <a:p>
             <a:fld id="{78C97017-6FC3-485B-9764-EAC9E56C1D49}" type="datetimeFigureOut">
               <a:rPr lang="en-US" smtClean="0"/>
-              <a:t>4/1/2019</a:t>
+              <a:t>4/14/19</a:t>
             </a:fld>
             <a:endParaRPr lang="en-US"/>
           </a:p>
@@ -1168,7 +1168,7 @@
           <a:p>
             <a:fld id="{78C97017-6FC3-485B-9764-EAC9E56C1D49}" type="datetimeFigureOut">
               <a:rPr lang="en-US" smtClean="0"/>
-              <a:t>4/1/2019</a:t>
+              <a:t>4/14/19</a:t>
             </a:fld>
             <a:endParaRPr lang="en-US"/>
           </a:p>
@@ -1413,7 +1413,7 @@
           <a:p>
             <a:fld id="{78C97017-6FC3-485B-9764-EAC9E56C1D49}" type="datetimeFigureOut">
               <a:rPr lang="en-US" smtClean="0"/>
-              <a:t>4/1/2019</a:t>
+              <a:t>4/14/19</a:t>
             </a:fld>
             <a:endParaRPr lang="en-US"/>
           </a:p>
@@ -1698,7 +1698,7 @@
           <a:p>
             <a:fld id="{78C97017-6FC3-485B-9764-EAC9E56C1D49}" type="datetimeFigureOut">
               <a:rPr lang="en-US" smtClean="0"/>
-              <a:t>4/1/2019</a:t>
+              <a:t>4/14/19</a:t>
             </a:fld>
             <a:endParaRPr lang="en-US"/>
           </a:p>
@@ -2117,7 +2117,7 @@
           <a:p>
             <a:fld id="{78C97017-6FC3-485B-9764-EAC9E56C1D49}" type="datetimeFigureOut">
               <a:rPr lang="en-US" smtClean="0"/>
-              <a:t>4/1/2019</a:t>
+              <a:t>4/14/19</a:t>
             </a:fld>
             <a:endParaRPr lang="en-US"/>
           </a:p>
@@ -2234,7 +2234,7 @@
           <a:p>
             <a:fld id="{78C97017-6FC3-485B-9764-EAC9E56C1D49}" type="datetimeFigureOut">
               <a:rPr lang="en-US" smtClean="0"/>
-              <a:t>4/1/2019</a:t>
+              <a:t>4/14/19</a:t>
             </a:fld>
             <a:endParaRPr lang="en-US"/>
           </a:p>
@@ -2329,7 +2329,7 @@
           <a:p>
             <a:fld id="{78C97017-6FC3-485B-9764-EAC9E56C1D49}" type="datetimeFigureOut">
               <a:rPr lang="en-US" smtClean="0"/>
-              <a:t>4/1/2019</a:t>
+              <a:t>4/14/19</a:t>
             </a:fld>
             <a:endParaRPr lang="en-US"/>
           </a:p>
@@ -2604,7 +2604,7 @@
           <a:p>
             <a:fld id="{78C97017-6FC3-485B-9764-EAC9E56C1D49}" type="datetimeFigureOut">
               <a:rPr lang="en-US" smtClean="0"/>
-              <a:t>4/1/2019</a:t>
+              <a:t>4/14/19</a:t>
             </a:fld>
             <a:endParaRPr lang="en-US"/>
           </a:p>
@@ -2856,7 +2856,7 @@
           <a:p>
             <a:fld id="{78C97017-6FC3-485B-9764-EAC9E56C1D49}" type="datetimeFigureOut">
               <a:rPr lang="en-US" smtClean="0"/>
-              <a:t>4/1/2019</a:t>
+              <a:t>4/14/19</a:t>
             </a:fld>
             <a:endParaRPr lang="en-US"/>
           </a:p>
@@ -3067,7 +3067,7 @@
           <a:p>
             <a:fld id="{78C97017-6FC3-485B-9764-EAC9E56C1D49}" type="datetimeFigureOut">
               <a:rPr lang="en-US" smtClean="0"/>
-              <a:t>4/1/2019</a:t>
+              <a:t>4/14/19</a:t>
             </a:fld>
             <a:endParaRPr lang="en-US"/>
           </a:p>
@@ -3899,18 +3899,13 @@
             <a:p>
               <a:pPr algn="ctr"/>
               <a:r>
-                <a:rPr lang="en-US" sz="1050" dirty="0" err="1">
+                <a:rPr lang="en-US" sz="1050" dirty="0">
                   <a:solidFill>
                     <a:schemeClr val="bg1"/>
                   </a:solidFill>
                 </a:rPr>
-                <a:t>AddressBook</a:t>
+                <a:t>Command</a:t>
               </a:r>
-              <a:endParaRPr lang="en-US" sz="1050" dirty="0">
-                <a:solidFill>
-                  <a:schemeClr val="bg1"/>
-                </a:solidFill>
-              </a:endParaRPr>
             </a:p>
             <a:p>
               <a:pPr algn="ctr"/>
@@ -7380,6 +7375,110 @@
           </a:fontRef>
         </p:style>
       </p:cxnSp>
+      <p:cxnSp>
+        <p:nvCxnSpPr>
+          <p:cNvPr id="92" name="Elbow Connector 49">
+            <a:extLst>
+              <a:ext uri="{FF2B5EF4-FFF2-40B4-BE49-F238E27FC236}">
+                <a16:creationId xmlns:a16="http://schemas.microsoft.com/office/drawing/2014/main" id="{4293F5C1-B87A-224E-AA5C-BA30BDA6265E}"/>
+              </a:ext>
+            </a:extLst>
+          </p:cNvPr>
+          <p:cNvCxnSpPr>
+            <a:cxnSpLocks/>
+          </p:cNvCxnSpPr>
+          <p:nvPr/>
+        </p:nvCxnSpPr>
+        <p:spPr>
+          <a:xfrm flipV="1">
+            <a:off x="4349160" y="2540166"/>
+            <a:ext cx="1708796" cy="941139"/>
+          </a:xfrm>
+          <a:prstGeom prst="bentConnector3">
+            <a:avLst>
+              <a:gd name="adj1" fmla="val 222"/>
+            </a:avLst>
+          </a:prstGeom>
+          <a:ln w="19050">
+            <a:solidFill>
+              <a:schemeClr val="accent5">
+                <a:lumMod val="60000"/>
+                <a:lumOff val="40000"/>
+              </a:schemeClr>
+            </a:solidFill>
+            <a:prstDash val="sysDot"/>
+            <a:headEnd type="none" w="med" len="med"/>
+            <a:tailEnd type="none" w="med" len="med"/>
+          </a:ln>
+          <a:effectLst/>
+        </p:spPr>
+        <p:style>
+          <a:lnRef idx="1">
+            <a:schemeClr val="accent2"/>
+          </a:lnRef>
+          <a:fillRef idx="2">
+            <a:schemeClr val="accent2"/>
+          </a:fillRef>
+          <a:effectRef idx="1">
+            <a:schemeClr val="accent2"/>
+          </a:effectRef>
+          <a:fontRef idx="minor">
+            <a:schemeClr val="dk1"/>
+          </a:fontRef>
+        </p:style>
+      </p:cxnSp>
+      <p:cxnSp>
+        <p:nvCxnSpPr>
+          <p:cNvPr id="108" name="Elbow Connector 49">
+            <a:extLst>
+              <a:ext uri="{FF2B5EF4-FFF2-40B4-BE49-F238E27FC236}">
+                <a16:creationId xmlns:a16="http://schemas.microsoft.com/office/drawing/2014/main" id="{E92C15DE-4D6C-7443-8F61-272FFE90BDD1}"/>
+              </a:ext>
+            </a:extLst>
+          </p:cNvPr>
+          <p:cNvCxnSpPr>
+            <a:cxnSpLocks/>
+          </p:cNvCxnSpPr>
+          <p:nvPr/>
+        </p:nvCxnSpPr>
+        <p:spPr>
+          <a:xfrm rot="16200000" flipV="1">
+            <a:off x="5924931" y="2407167"/>
+            <a:ext cx="276539" cy="1"/>
+          </a:xfrm>
+          <a:prstGeom prst="bentConnector3">
+            <a:avLst>
+              <a:gd name="adj1" fmla="val 50000"/>
+            </a:avLst>
+          </a:prstGeom>
+          <a:ln w="19050">
+            <a:solidFill>
+              <a:schemeClr val="accent5">
+                <a:lumMod val="60000"/>
+                <a:lumOff val="40000"/>
+              </a:schemeClr>
+            </a:solidFill>
+            <a:prstDash val="sysDot"/>
+            <a:headEnd type="none" w="med" len="med"/>
+            <a:tailEnd type="arrow" w="med" len="med"/>
+          </a:ln>
+          <a:effectLst/>
+        </p:spPr>
+        <p:style>
+          <a:lnRef idx="1">
+            <a:schemeClr val="accent2"/>
+          </a:lnRef>
+          <a:fillRef idx="2">
+            <a:schemeClr val="accent2"/>
+          </a:fillRef>
+          <a:effectRef idx="1">
+            <a:schemeClr val="accent2"/>
+          </a:effectRef>
+          <a:fontRef idx="minor">
+            <a:schemeClr val="dk1"/>
+          </a:fontRef>
+        </p:style>
+      </p:cxnSp>
     </p:spTree>
     <p:extLst>
       <p:ext uri="{BB962C8B-B14F-4D97-AF65-F5344CB8AC3E}">

</xml_diff>